<commit_message>
Confirm removal of Office temporary file
</commit_message>
<xml_diff>
--- a/03_genotype_processing/summary.pptx
+++ b/03_genotype_processing/summary.pptx
@@ -105,14 +105,6 @@
     </a:lvl9pPr>
   </p:defaultTextStyle>
 </p:presentation>
-</file>
-
-<file path=ppt/revisionInfo.xml><?xml version="1.0" encoding="utf-8"?>
-<p1510:revInfo xmlns:a="http://schemas.openxmlformats.org/drawingml/2006/main" xmlns:r="http://schemas.openxmlformats.org/officeDocument/2006/relationships" xmlns:p1510="http://schemas.microsoft.com/office/powerpoint/2015/10/main">
-  <p1510:revLst>
-    <p1510:client id="{9E703635-F60F-44A6-ACD5-6F28996BD8D0}" v="55" dt="2026-01-26T06:25:17.935"/>
-  </p1510:revLst>
-</p1510:revInfo>
 </file>
 
 <file path=ppt/slideLayouts/slideLayout1.xml><?xml version="1.0" encoding="utf-8"?>

</xml_diff>

<commit_message>
Reorganize scripts and add genotype QC documentation
</commit_message>
<xml_diff>
--- a/03_genotype_processing/summary.pptx
+++ b/03_genotype_processing/summary.pptx
@@ -4553,8 +4553,8 @@
           </p:nvSpPr>
           <p:spPr>
             <a:xfrm>
-              <a:off x="1772407" y="2157380"/>
-              <a:ext cx="1051442" cy="307777"/>
+              <a:off x="2072445" y="2157379"/>
+              <a:ext cx="705193" cy="307777"/>
             </a:xfrm>
             <a:prstGeom prst="rect">
               <a:avLst/>
@@ -4568,10 +4568,10 @@
             <a:lstStyle/>
             <a:p>
               <a:r>
-                <a:rPr lang="en-US" altLang="zh-TW" sz="1400" dirty="0"/>
-                <a:t>qc_flow.txt</a:t>
+                <a:rPr lang="en-US" altLang="zh-TW" sz="1400" b="1" dirty="0"/>
+                <a:t>qc.md</a:t>
               </a:r>
-              <a:endParaRPr lang="zh-TW" altLang="en-US" sz="1400" dirty="0"/>
+              <a:endParaRPr lang="zh-TW" altLang="en-US" sz="1400" b="1" dirty="0"/>
             </a:p>
           </p:txBody>
         </p:sp>
@@ -4589,8 +4589,8 @@
           </p:nvSpPr>
           <p:spPr>
             <a:xfrm>
-              <a:off x="1673534" y="3660305"/>
-              <a:ext cx="1150315" cy="307777"/>
+              <a:off x="1590241" y="3660303"/>
+              <a:ext cx="1306255" cy="307777"/>
             </a:xfrm>
             <a:prstGeom prst="rect">
               <a:avLst/>
@@ -4604,10 +4604,10 @@
             <a:lstStyle/>
             <a:p>
               <a:r>
-                <a:rPr lang="en-US" altLang="zh-TW" sz="1400" dirty="0"/>
-                <a:t>Bolt-lmm.txt</a:t>
+                <a:rPr lang="en-US" altLang="zh-TW" sz="1400" b="1" dirty="0"/>
+                <a:t>Bolt-lmm.md</a:t>
               </a:r>
-              <a:endParaRPr lang="zh-TW" altLang="en-US" sz="1400" dirty="0"/>
+              <a:endParaRPr lang="zh-TW" altLang="en-US" sz="1400" b="1" dirty="0"/>
             </a:p>
           </p:txBody>
         </p:sp>
@@ -4640,10 +4640,10 @@
             <a:lstStyle/>
             <a:p>
               <a:r>
-                <a:rPr lang="en-US" altLang="zh-TW" sz="1400" dirty="0" err="1"/>
+                <a:rPr lang="en-US" altLang="zh-TW" sz="1400" b="1" dirty="0" err="1"/>
                 <a:t>manhattan_qq_sigsnps.R</a:t>
               </a:r>
-              <a:endParaRPr lang="zh-TW" altLang="en-US" sz="1400" dirty="0"/>
+              <a:endParaRPr lang="zh-TW" altLang="en-US" sz="1400" b="1" dirty="0"/>
             </a:p>
           </p:txBody>
         </p:sp>
@@ -4661,8 +4661,8 @@
           </p:nvSpPr>
           <p:spPr>
             <a:xfrm>
-              <a:off x="5014411" y="2157379"/>
-              <a:ext cx="1183786" cy="307777"/>
+              <a:off x="4840989" y="2157379"/>
+              <a:ext cx="1305229" cy="307777"/>
             </a:xfrm>
             <a:prstGeom prst="rect">
               <a:avLst/>
@@ -4676,10 +4676,10 @@
             <a:lstStyle/>
             <a:p>
               <a:r>
-                <a:rPr lang="en-US" altLang="zh-TW" sz="1400" dirty="0"/>
-                <a:t>qc_helper.txt</a:t>
+                <a:rPr lang="en-US" altLang="zh-TW" sz="1400" b="1" dirty="0"/>
+                <a:t>qc_helper.md</a:t>
               </a:r>
-              <a:endParaRPr lang="zh-TW" altLang="en-US" sz="1400" dirty="0"/>
+              <a:endParaRPr lang="zh-TW" altLang="en-US" sz="1400" b="1" dirty="0"/>
             </a:p>
           </p:txBody>
         </p:sp>
@@ -4875,7 +4875,7 @@
           <p:spPr>
             <a:xfrm>
               <a:off x="5381336" y="3660304"/>
-              <a:ext cx="690574" cy="307777"/>
+              <a:ext cx="714811" cy="307777"/>
             </a:xfrm>
             <a:prstGeom prst="rect">
               <a:avLst/>
@@ -4889,10 +4889,10 @@
             <a:lstStyle/>
             <a:p>
               <a:r>
-                <a:rPr lang="en-US" altLang="zh-TW" sz="1400" dirty="0" err="1"/>
+                <a:rPr lang="en-US" altLang="zh-TW" sz="1400" b="1" dirty="0" err="1"/>
                 <a:t>map.R</a:t>
               </a:r>
-              <a:endParaRPr lang="zh-TW" altLang="en-US" sz="1400" dirty="0"/>
+              <a:endParaRPr lang="zh-TW" altLang="en-US" sz="1400" b="1" dirty="0"/>
             </a:p>
           </p:txBody>
         </p:sp>
@@ -4954,7 +4954,7 @@
           <p:spPr>
             <a:xfrm>
               <a:off x="5410703" y="5097507"/>
-              <a:ext cx="740139" cy="307777"/>
+              <a:ext cx="777200" cy="307777"/>
             </a:xfrm>
             <a:prstGeom prst="rect">
               <a:avLst/>
@@ -4968,10 +4968,10 @@
             <a:lstStyle/>
             <a:p>
               <a:r>
-                <a:rPr lang="en-US" altLang="zh-TW" sz="1400" dirty="0"/>
+                <a:rPr lang="en-US" altLang="zh-TW" sz="1400" b="1" dirty="0"/>
                 <a:t>ldsc.py</a:t>
               </a:r>
-              <a:endParaRPr lang="zh-TW" altLang="en-US" sz="1400" dirty="0"/>
+              <a:endParaRPr lang="zh-TW" altLang="en-US" sz="1400" b="1" dirty="0"/>
             </a:p>
           </p:txBody>
         </p:sp>
@@ -5177,7 +5177,7 @@
           <p:spPr>
             <a:xfrm>
               <a:off x="8692250" y="4117813"/>
-              <a:ext cx="942053" cy="307777"/>
+              <a:ext cx="982577" cy="307777"/>
             </a:xfrm>
             <a:prstGeom prst="rect">
               <a:avLst/>
@@ -5191,10 +5191,10 @@
             <a:lstStyle/>
             <a:p>
               <a:r>
-                <a:rPr lang="en-US" altLang="zh-TW" sz="1400" dirty="0"/>
+                <a:rPr lang="en-US" altLang="zh-TW" sz="1400" b="1" dirty="0"/>
                 <a:t>ldpred2.R</a:t>
               </a:r>
-              <a:endParaRPr lang="zh-TW" altLang="en-US" sz="1400" dirty="0"/>
+              <a:endParaRPr lang="zh-TW" altLang="en-US" sz="1400" b="1" dirty="0"/>
             </a:p>
           </p:txBody>
         </p:sp>
@@ -5531,10 +5531,10 @@
           <a:lstStyle/>
           <a:p>
             <a:r>
-              <a:rPr lang="en-US" altLang="zh-TW" dirty="0"/>
+              <a:rPr lang="en-US" altLang="zh-TW" b="1" dirty="0"/>
               <a:t>Res_fc_pgs/03_genotype_processing</a:t>
             </a:r>
-            <a:endParaRPr lang="zh-TW" altLang="en-US" dirty="0"/>
+            <a:endParaRPr lang="zh-TW" altLang="en-US" b="1" dirty="0"/>
           </a:p>
         </p:txBody>
       </p:sp>
@@ -5639,10 +5639,10 @@
           <a:lstStyle/>
           <a:p>
             <a:r>
-              <a:rPr lang="en-US" altLang="zh-TW" dirty="0"/>
+              <a:rPr lang="en-US" altLang="zh-TW" b="1" dirty="0"/>
               <a:t>Genotype QC flow</a:t>
             </a:r>
-            <a:endParaRPr lang="zh-TW" altLang="en-US" dirty="0"/>
+            <a:endParaRPr lang="zh-TW" altLang="en-US" b="1" dirty="0"/>
           </a:p>
         </p:txBody>
       </p:sp>
@@ -5854,10 +5854,10 @@
       </p:sp>
       <p:grpSp>
         <p:nvGrpSpPr>
-          <p:cNvPr id="142" name="群組 141">
+          <p:cNvPr id="159" name="群組 158">
             <a:extLst>
               <a:ext uri="{FF2B5EF4-FFF2-40B4-BE49-F238E27FC236}">
-                <a16:creationId xmlns:a16="http://schemas.microsoft.com/office/drawing/2014/main" id="{8577954D-47B5-42AC-857E-78A8E88D0C71}"/>
+                <a16:creationId xmlns:a16="http://schemas.microsoft.com/office/drawing/2014/main" id="{8B881A24-7019-1889-B827-4A8F05FD2F0D}"/>
               </a:ext>
             </a:extLst>
           </p:cNvPr>
@@ -5866,383 +5866,1370 @@
         </p:nvGrpSpPr>
         <p:grpSpPr>
           <a:xfrm>
-            <a:off x="2206282" y="380873"/>
-            <a:ext cx="9778184" cy="5653502"/>
-            <a:chOff x="2206282" y="380873"/>
-            <a:chExt cx="9778184" cy="5653502"/>
+            <a:off x="2087219" y="380873"/>
+            <a:ext cx="9897247" cy="6286626"/>
+            <a:chOff x="2087219" y="380873"/>
+            <a:chExt cx="9897247" cy="6286626"/>
           </a:xfrm>
         </p:grpSpPr>
-        <mc:AlternateContent xmlns:mc="http://schemas.openxmlformats.org/markup-compatibility/2006">
-          <mc:Choice xmlns:a14="http://schemas.microsoft.com/office/drawing/2010/main" Requires="a14">
-            <p:sp>
-              <p:nvSpPr>
-                <p:cNvPr id="128" name="矩形: 圓角 127">
-                  <a:extLst>
-                    <a:ext uri="{FF2B5EF4-FFF2-40B4-BE49-F238E27FC236}">
-                      <a16:creationId xmlns:a16="http://schemas.microsoft.com/office/drawing/2014/main" id="{EE58B19E-AE78-1EAD-AA4B-2EEB89DED163}"/>
-                    </a:ext>
-                  </a:extLst>
-                </p:cNvPr>
-                <p:cNvSpPr/>
-                <p:nvPr/>
-              </p:nvSpPr>
-              <p:spPr>
-                <a:xfrm>
-                  <a:off x="6545736" y="380873"/>
-                  <a:ext cx="5405392" cy="1874332"/>
-                </a:xfrm>
-                <a:prstGeom prst="roundRect">
-                  <a:avLst/>
-                </a:prstGeom>
-                <a:solidFill>
-                  <a:schemeClr val="bg1"/>
-                </a:solidFill>
-              </p:spPr>
-              <p:style>
-                <a:lnRef idx="2">
-                  <a:schemeClr val="accent1">
-                    <a:shade val="15000"/>
-                  </a:schemeClr>
-                </a:lnRef>
-                <a:fillRef idx="1">
-                  <a:schemeClr val="accent1"/>
-                </a:fillRef>
-                <a:effectRef idx="0">
-                  <a:schemeClr val="accent1"/>
-                </a:effectRef>
-                <a:fontRef idx="minor">
-                  <a:schemeClr val="lt1"/>
-                </a:fontRef>
-              </p:style>
-              <p:txBody>
-                <a:bodyPr rtlCol="0" anchor="ctr"/>
-                <a:lstStyle/>
-                <a:p>
-                  <a:pPr marL="372340" indent="-372340" defTabSz="457200">
-                    <a:spcBef>
-                      <a:spcPts val="1300"/>
-                    </a:spcBef>
-                    <a:buSzPct val="150000"/>
-                    <a:buChar char="•"/>
-                    <a:defRPr sz="3000">
-                      <a:latin typeface="Helvetica Neue"/>
-                      <a:ea typeface="Helvetica Neue"/>
-                      <a:cs typeface="Helvetica Neue"/>
-                      <a:sym typeface="Helvetica Neue"/>
-                    </a:defRPr>
-                  </a:pPr>
-                  <a:r>
-                    <a:rPr lang="en-US" altLang="zh-TW" sz="1100" dirty="0">
-                      <a:solidFill>
-                        <a:schemeClr val="tx1"/>
-                      </a:solidFill>
-                    </a:rPr>
-                    <a:t>Sex discrepancy check: 0.2</a:t>
-                  </a:r>
-                  <a14:m>
-                    <m:oMath xmlns:m="http://schemas.openxmlformats.org/officeDocument/2006/math">
-                      <m:r>
-                        <a:rPr lang="en-US" altLang="zh-TW" sz="1100" i="1">
-                          <a:solidFill>
-                            <a:schemeClr val="tx1"/>
-                          </a:solidFill>
-                          <a:latin typeface="Cambria Math" panose="02040503050406030204" pitchFamily="18" charset="0"/>
-                        </a:rPr>
-                        <m:t>≤</m:t>
-                      </m:r>
-                      <m:sSub>
-                        <m:sSubPr>
-                          <m:ctrlPr>
-                            <a:rPr lang="ar-AE" altLang="zh-TW" sz="1100" i="1">
-                              <a:solidFill>
-                                <a:schemeClr val="tx1"/>
-                              </a:solidFill>
-                              <a:latin typeface="Cambria Math" panose="02040503050406030204" pitchFamily="18" charset="0"/>
-                            </a:rPr>
-                          </m:ctrlPr>
-                        </m:sSubPr>
-                        <m:e>
-                          <m:r>
-                            <a:rPr lang="zh-TW" altLang="ar-AE" sz="1100" i="1">
-                              <a:solidFill>
-                                <a:schemeClr val="tx1"/>
-                              </a:solidFill>
-                              <a:latin typeface="Cambria Math" panose="02040503050406030204" pitchFamily="18" charset="0"/>
-                            </a:rPr>
-                            <m:t>𝖥</m:t>
-                          </m:r>
-                        </m:e>
-                        <m:sub>
-                          <m:r>
-                            <a:rPr lang="zh-TW" altLang="ar-AE" sz="1100" i="1">
-                              <a:solidFill>
-                                <a:schemeClr val="tx1"/>
-                              </a:solidFill>
-                              <a:latin typeface="Cambria Math" panose="02040503050406030204" pitchFamily="18" charset="0"/>
-                            </a:rPr>
-                            <m:t>𝖷</m:t>
-                          </m:r>
-                        </m:sub>
-                      </m:sSub>
-                      <m:r>
-                        <a:rPr lang="ar-AE" altLang="zh-TW" sz="1100" i="1" smtClean="0">
-                          <a:solidFill>
-                            <a:schemeClr val="tx1"/>
-                          </a:solidFill>
-                          <a:latin typeface="Cambria Math" panose="02040503050406030204" pitchFamily="18" charset="0"/>
-                        </a:rPr>
-                        <m:t>≤</m:t>
-                      </m:r>
-                    </m:oMath>
-                  </a14:m>
-                  <a:r>
-                    <a:rPr lang="ar-AE" altLang="zh-TW" sz="1100" dirty="0">
-                      <a:solidFill>
-                        <a:schemeClr val="tx1"/>
-                      </a:solidFill>
-                    </a:rPr>
-                    <a:t> 0.8</a:t>
-                  </a:r>
-                  <a:r>
-                    <a:rPr lang="en-US" altLang="zh-TW" sz="1100" dirty="0">
-                      <a:solidFill>
-                        <a:schemeClr val="tx1"/>
-                      </a:solidFill>
-                    </a:rPr>
-                    <a:t>: Imputation data has already excluded</a:t>
-                  </a:r>
-                </a:p>
-                <a:p>
-                  <a:pPr marL="372340" indent="-372340" defTabSz="457200">
-                    <a:spcBef>
-                      <a:spcPts val="1300"/>
-                    </a:spcBef>
-                    <a:buSzPct val="150000"/>
-                    <a:buChar char="•"/>
-                    <a:defRPr sz="3000">
-                      <a:latin typeface="Helvetica Neue"/>
-                      <a:ea typeface="Helvetica Neue"/>
-                      <a:cs typeface="Helvetica Neue"/>
-                      <a:sym typeface="Helvetica Neue"/>
-                    </a:defRPr>
-                  </a:pPr>
-                  <a:r>
-                    <a:rPr lang="en-US" altLang="zh-TW" sz="1100" dirty="0">
-                      <a:solidFill>
-                        <a:schemeClr val="tx1"/>
-                      </a:solidFill>
-                    </a:rPr>
-                    <a:t>Heterozygosity out of </a:t>
-                  </a:r>
-                  <a14:m>
-                    <m:oMath xmlns:m="http://schemas.openxmlformats.org/officeDocument/2006/math">
-                      <m:r>
-                        <a:rPr lang="zh-TW" altLang="en-US" sz="1100" i="1">
-                          <a:solidFill>
-                            <a:schemeClr val="tx1"/>
-                          </a:solidFill>
-                          <a:latin typeface="Cambria Math" panose="02040503050406030204" pitchFamily="18" charset="0"/>
-                        </a:rPr>
-                        <m:t>𝟥</m:t>
-                      </m:r>
-                      <m:r>
-                        <a:rPr lang="zh-TW" altLang="en-US" sz="1100" i="1">
-                          <a:solidFill>
-                            <a:schemeClr val="tx1"/>
-                          </a:solidFill>
-                          <a:latin typeface="Cambria Math" panose="02040503050406030204" pitchFamily="18" charset="0"/>
-                        </a:rPr>
-                        <m:t>𝜎</m:t>
-                      </m:r>
-                    </m:oMath>
-                  </a14:m>
-                  <a:r>
-                    <a:rPr lang="en-US" altLang="zh-TW" sz="1100" dirty="0">
-                      <a:solidFill>
-                        <a:schemeClr val="tx1"/>
-                      </a:solidFill>
-                    </a:rPr>
-                    <a:t>; missing rate &gt; 0.05 </a:t>
-                  </a:r>
-                  <a14:m>
-                    <m:oMath xmlns:m="http://schemas.openxmlformats.org/officeDocument/2006/math">
-                      <m:r>
-                        <a:rPr lang="en-US" altLang="zh-TW" sz="1100" i="1">
-                          <a:solidFill>
-                            <a:schemeClr val="tx1"/>
-                          </a:solidFill>
-                          <a:latin typeface="Cambria Math" panose="02040503050406030204" pitchFamily="18" charset="0"/>
-                        </a:rPr>
-                        <m:t>⟹</m:t>
-                      </m:r>
-                    </m:oMath>
-                  </a14:m>
-                  <a:r>
-                    <a:rPr lang="en-US" altLang="zh-TW" sz="1100" dirty="0">
-                      <a:solidFill>
-                        <a:schemeClr val="tx1"/>
-                      </a:solidFill>
-                    </a:rPr>
-                    <a:t> 962 samples removed</a:t>
-                  </a:r>
-                </a:p>
-                <a:p>
-                  <a:pPr marL="372340" indent="-372340" defTabSz="457200">
-                    <a:spcBef>
-                      <a:spcPts val="1300"/>
-                    </a:spcBef>
-                    <a:buSzPct val="150000"/>
-                    <a:buChar char="•"/>
-                    <a:defRPr sz="3000">
-                      <a:latin typeface="Helvetica Neue"/>
-                      <a:ea typeface="Helvetica Neue"/>
-                      <a:cs typeface="Helvetica Neue"/>
-                      <a:sym typeface="Helvetica Neue"/>
-                    </a:defRPr>
-                  </a:pPr>
-                  <a:r>
-                    <a:rPr lang="en-US" altLang="zh-TW" sz="1100" dirty="0">
-                      <a:solidFill>
-                        <a:schemeClr val="tx1"/>
-                      </a:solidFill>
-                    </a:rPr>
-                    <a:t>Relatedness: BOLT-LMM accounts for relatedness structure</a:t>
-                  </a:r>
-                </a:p>
-                <a:p>
-                  <a:pPr marL="372340" indent="-372340" defTabSz="457200">
-                    <a:spcBef>
-                      <a:spcPts val="1300"/>
-                    </a:spcBef>
-                    <a:buSzPct val="150000"/>
-                    <a:buChar char="•"/>
-                    <a:defRPr sz="3000">
-                      <a:latin typeface="Helvetica Neue"/>
-                      <a:ea typeface="Helvetica Neue"/>
-                      <a:cs typeface="Helvetica Neue"/>
-                      <a:sym typeface="Helvetica Neue"/>
-                    </a:defRPr>
-                  </a:pPr>
-                  <a:r>
-                    <a:rPr lang="en-US" altLang="zh-TW" sz="1100" dirty="0">
-                      <a:solidFill>
-                        <a:schemeClr val="tx1"/>
-                      </a:solidFill>
-                    </a:rPr>
-                    <a:t>Population stratification: only self-reported white samples included </a:t>
-                  </a:r>
-                  <a14:m>
-                    <m:oMath xmlns:m="http://schemas.openxmlformats.org/officeDocument/2006/math">
-                      <m:r>
-                        <a:rPr lang="en-US" altLang="zh-TW" sz="1100" i="1">
-                          <a:solidFill>
-                            <a:schemeClr val="tx1"/>
-                          </a:solidFill>
-                          <a:latin typeface="Cambria Math" panose="02040503050406030204" pitchFamily="18" charset="0"/>
-                        </a:rPr>
-                        <m:t>⟹</m:t>
-                      </m:r>
-                    </m:oMath>
-                  </a14:m>
-                  <a:r>
-                    <a:rPr lang="en-US" altLang="zh-TW" sz="1100" dirty="0">
-                      <a:solidFill>
-                        <a:schemeClr val="tx1"/>
-                      </a:solidFill>
-                    </a:rPr>
-                    <a:t> 28,493 samples removed</a:t>
-                  </a:r>
-                </a:p>
-              </p:txBody>
-            </p:sp>
-          </mc:Choice>
-          <mc:Fallback>
-            <p:sp>
-              <p:nvSpPr>
-                <p:cNvPr id="128" name="矩形: 圓角 127">
-                  <a:extLst>
-                    <a:ext uri="{FF2B5EF4-FFF2-40B4-BE49-F238E27FC236}">
-                      <a16:creationId xmlns:a16="http://schemas.microsoft.com/office/drawing/2014/main" id="{EE58B19E-AE78-1EAD-AA4B-2EEB89DED163}"/>
-                    </a:ext>
-                  </a:extLst>
-                </p:cNvPr>
-                <p:cNvSpPr>
-                  <a:spLocks noRot="1" noChangeAspect="1" noMove="1" noResize="1" noEditPoints="1" noAdjustHandles="1" noChangeArrowheads="1" noChangeShapeType="1" noTextEdit="1"/>
-                </p:cNvSpPr>
-                <p:nvPr/>
-              </p:nvSpPr>
-              <p:spPr>
-                <a:xfrm>
-                  <a:off x="6545736" y="380873"/>
-                  <a:ext cx="5405392" cy="1874332"/>
-                </a:xfrm>
-                <a:prstGeom prst="roundRect">
-                  <a:avLst/>
-                </a:prstGeom>
-                <a:blipFill>
-                  <a:blip r:embed="rId3"/>
-                  <a:stretch>
-                    <a:fillRect/>
-                  </a:stretch>
-                </a:blipFill>
-              </p:spPr>
-              <p:txBody>
-                <a:bodyPr/>
-                <a:lstStyle/>
-                <a:p>
-                  <a:r>
-                    <a:rPr lang="zh-TW" altLang="en-US">
-                      <a:noFill/>
-                    </a:rPr>
-                    <a:t> </a:t>
-                  </a:r>
-                </a:p>
-              </p:txBody>
-            </p:sp>
-          </mc:Fallback>
-        </mc:AlternateContent>
-        <p:sp>
-          <p:nvSpPr>
-            <p:cNvPr id="6" name="文字方塊 5">
+        <p:grpSp>
+          <p:nvGrpSpPr>
+            <p:cNvPr id="142" name="群組 141">
               <a:extLst>
                 <a:ext uri="{FF2B5EF4-FFF2-40B4-BE49-F238E27FC236}">
-                  <a16:creationId xmlns:a16="http://schemas.microsoft.com/office/drawing/2014/main" id="{7B8B4CE8-533B-74EE-6943-A79181668183}"/>
+                  <a16:creationId xmlns:a16="http://schemas.microsoft.com/office/drawing/2014/main" id="{8577954D-47B5-42AC-857E-78A8E88D0C71}"/>
                 </a:ext>
               </a:extLst>
             </p:cNvPr>
-            <p:cNvSpPr txBox="1"/>
+            <p:cNvGrpSpPr/>
             <p:nvPr/>
-          </p:nvSpPr>
-          <p:spPr>
+          </p:nvGrpSpPr>
+          <p:grpSpPr>
             <a:xfrm>
-              <a:off x="4680278" y="1947427"/>
-              <a:ext cx="1071127" cy="307777"/>
+              <a:off x="2087219" y="380873"/>
+              <a:ext cx="9897247" cy="5653502"/>
+              <a:chOff x="2087219" y="380873"/>
+              <a:chExt cx="9897247" cy="5653502"/>
             </a:xfrm>
-            <a:prstGeom prst="rect">
-              <a:avLst/>
-            </a:prstGeom>
-            <a:noFill/>
-          </p:spPr>
-          <p:txBody>
-            <a:bodyPr wrap="none" rtlCol="0">
-              <a:spAutoFit/>
-            </a:bodyPr>
-            <a:lstStyle/>
-            <a:p>
-              <a:r>
-                <a:rPr lang="en-US" altLang="zh-TW" sz="1400" dirty="0"/>
-                <a:t>Sample QC</a:t>
-              </a:r>
-              <a:endParaRPr lang="zh-TW" altLang="en-US" sz="1400" dirty="0"/>
-            </a:p>
-          </p:txBody>
-        </p:sp>
+          </p:grpSpPr>
+          <mc:AlternateContent xmlns:mc="http://schemas.openxmlformats.org/markup-compatibility/2006">
+            <mc:Choice xmlns:a14="http://schemas.microsoft.com/office/drawing/2010/main" Requires="a14">
+              <p:sp>
+                <p:nvSpPr>
+                  <p:cNvPr id="128" name="矩形: 圓角 127">
+                    <a:extLst>
+                      <a:ext uri="{FF2B5EF4-FFF2-40B4-BE49-F238E27FC236}">
+                        <a16:creationId xmlns:a16="http://schemas.microsoft.com/office/drawing/2014/main" id="{EE58B19E-AE78-1EAD-AA4B-2EEB89DED163}"/>
+                      </a:ext>
+                    </a:extLst>
+                  </p:cNvPr>
+                  <p:cNvSpPr/>
+                  <p:nvPr/>
+                </p:nvSpPr>
+                <p:spPr>
+                  <a:xfrm>
+                    <a:off x="6545736" y="380873"/>
+                    <a:ext cx="5405392" cy="1874332"/>
+                  </a:xfrm>
+                  <a:prstGeom prst="roundRect">
+                    <a:avLst/>
+                  </a:prstGeom>
+                  <a:solidFill>
+                    <a:schemeClr val="bg1"/>
+                  </a:solidFill>
+                </p:spPr>
+                <p:style>
+                  <a:lnRef idx="2">
+                    <a:schemeClr val="accent1">
+                      <a:shade val="15000"/>
+                    </a:schemeClr>
+                  </a:lnRef>
+                  <a:fillRef idx="1">
+                    <a:schemeClr val="accent1"/>
+                  </a:fillRef>
+                  <a:effectRef idx="0">
+                    <a:schemeClr val="accent1"/>
+                  </a:effectRef>
+                  <a:fontRef idx="minor">
+                    <a:schemeClr val="lt1"/>
+                  </a:fontRef>
+                </p:style>
+                <p:txBody>
+                  <a:bodyPr rtlCol="0" anchor="ctr"/>
+                  <a:lstStyle/>
+                  <a:p>
+                    <a:pPr marL="372340" indent="-372340" defTabSz="457200">
+                      <a:spcBef>
+                        <a:spcPts val="1300"/>
+                      </a:spcBef>
+                      <a:buSzPct val="150000"/>
+                      <a:buChar char="•"/>
+                      <a:defRPr sz="3000">
+                        <a:latin typeface="Helvetica Neue"/>
+                        <a:ea typeface="Helvetica Neue"/>
+                        <a:cs typeface="Helvetica Neue"/>
+                        <a:sym typeface="Helvetica Neue"/>
+                      </a:defRPr>
+                    </a:pPr>
+                    <a:r>
+                      <a:rPr lang="en-US" altLang="zh-TW" sz="1100" dirty="0">
+                        <a:solidFill>
+                          <a:schemeClr val="tx1"/>
+                        </a:solidFill>
+                      </a:rPr>
+                      <a:t>Sex discrepancy check: 0.2</a:t>
+                    </a:r>
+                    <a14:m>
+                      <m:oMath xmlns:m="http://schemas.openxmlformats.org/officeDocument/2006/math">
+                        <m:r>
+                          <a:rPr lang="en-US" altLang="zh-TW" sz="1100" i="1" smtClean="0">
+                            <a:solidFill>
+                              <a:schemeClr val="tx1"/>
+                            </a:solidFill>
+                            <a:latin typeface="Cambria Math" panose="02040503050406030204" pitchFamily="18" charset="0"/>
+                          </a:rPr>
+                          <m:t>≤</m:t>
+                        </m:r>
+                        <m:sSub>
+                          <m:sSubPr>
+                            <m:ctrlPr>
+                              <a:rPr lang="ar-AE" altLang="zh-TW" sz="1100" i="1">
+                                <a:solidFill>
+                                  <a:schemeClr val="tx1"/>
+                                </a:solidFill>
+                                <a:latin typeface="Cambria Math" panose="02040503050406030204" pitchFamily="18" charset="0"/>
+                              </a:rPr>
+                            </m:ctrlPr>
+                          </m:sSubPr>
+                          <m:e>
+                            <m:r>
+                              <a:rPr lang="zh-TW" altLang="ar-AE" sz="1100" i="1" smtClean="0">
+                                <a:solidFill>
+                                  <a:schemeClr val="tx1"/>
+                                </a:solidFill>
+                                <a:latin typeface="Cambria Math" panose="02040503050406030204" pitchFamily="18" charset="0"/>
+                              </a:rPr>
+                              <m:t>𝖥</m:t>
+                            </m:r>
+                          </m:e>
+                          <m:sub>
+                            <m:r>
+                              <a:rPr lang="zh-TW" altLang="ar-AE" sz="1100" i="1" smtClean="0">
+                                <a:solidFill>
+                                  <a:schemeClr val="tx1"/>
+                                </a:solidFill>
+                                <a:latin typeface="Cambria Math" panose="02040503050406030204" pitchFamily="18" charset="0"/>
+                              </a:rPr>
+                              <m:t>𝖷</m:t>
+                            </m:r>
+                          </m:sub>
+                        </m:sSub>
+                        <m:r>
+                          <a:rPr lang="ar-AE" altLang="zh-TW" sz="1100" i="1" smtClean="0">
+                            <a:solidFill>
+                              <a:schemeClr val="tx1"/>
+                            </a:solidFill>
+                            <a:latin typeface="Cambria Math" panose="02040503050406030204" pitchFamily="18" charset="0"/>
+                          </a:rPr>
+                          <m:t>≤</m:t>
+                        </m:r>
+                      </m:oMath>
+                    </a14:m>
+                    <a:r>
+                      <a:rPr lang="ar-AE" altLang="zh-TW" sz="1100" dirty="0">
+                        <a:solidFill>
+                          <a:schemeClr val="tx1"/>
+                        </a:solidFill>
+                      </a:rPr>
+                      <a:t> 0.8</a:t>
+                    </a:r>
+                    <a:r>
+                      <a:rPr lang="en-US" altLang="zh-TW" sz="1100" dirty="0">
+                        <a:solidFill>
+                          <a:schemeClr val="tx1"/>
+                        </a:solidFill>
+                      </a:rPr>
+                      <a:t>: Imputation data has already excluded</a:t>
+                    </a:r>
+                  </a:p>
+                  <a:p>
+                    <a:pPr marL="372340" indent="-372340" defTabSz="457200">
+                      <a:spcBef>
+                        <a:spcPts val="1300"/>
+                      </a:spcBef>
+                      <a:buSzPct val="150000"/>
+                      <a:buChar char="•"/>
+                      <a:defRPr sz="3000">
+                        <a:latin typeface="Helvetica Neue"/>
+                        <a:ea typeface="Helvetica Neue"/>
+                        <a:cs typeface="Helvetica Neue"/>
+                        <a:sym typeface="Helvetica Neue"/>
+                      </a:defRPr>
+                    </a:pPr>
+                    <a:r>
+                      <a:rPr lang="en-US" altLang="zh-TW" sz="1100" dirty="0">
+                        <a:solidFill>
+                          <a:schemeClr val="tx1"/>
+                        </a:solidFill>
+                      </a:rPr>
+                      <a:t>Heterozygosity out of </a:t>
+                    </a:r>
+                    <a14:m>
+                      <m:oMath xmlns:m="http://schemas.openxmlformats.org/officeDocument/2006/math">
+                        <m:r>
+                          <a:rPr lang="zh-TW" altLang="en-US" sz="1100" i="1" smtClean="0">
+                            <a:solidFill>
+                              <a:schemeClr val="tx1"/>
+                            </a:solidFill>
+                            <a:latin typeface="Cambria Math" panose="02040503050406030204" pitchFamily="18" charset="0"/>
+                          </a:rPr>
+                          <m:t>𝟥</m:t>
+                        </m:r>
+                        <m:r>
+                          <a:rPr lang="zh-TW" altLang="en-US" sz="1100" i="1" smtClean="0">
+                            <a:solidFill>
+                              <a:schemeClr val="tx1"/>
+                            </a:solidFill>
+                            <a:latin typeface="Cambria Math" panose="02040503050406030204" pitchFamily="18" charset="0"/>
+                          </a:rPr>
+                          <m:t>𝜎</m:t>
+                        </m:r>
+                      </m:oMath>
+                    </a14:m>
+                    <a:r>
+                      <a:rPr lang="en-US" altLang="zh-TW" sz="1100" dirty="0">
+                        <a:solidFill>
+                          <a:schemeClr val="tx1"/>
+                        </a:solidFill>
+                      </a:rPr>
+                      <a:t>; missing rate &gt; 0.05 </a:t>
+                    </a:r>
+                    <a14:m>
+                      <m:oMath xmlns:m="http://schemas.openxmlformats.org/officeDocument/2006/math">
+                        <m:r>
+                          <a:rPr lang="en-US" altLang="zh-TW" sz="1100" i="1" smtClean="0">
+                            <a:solidFill>
+                              <a:schemeClr val="tx1"/>
+                            </a:solidFill>
+                            <a:latin typeface="Cambria Math" panose="02040503050406030204" pitchFamily="18" charset="0"/>
+                          </a:rPr>
+                          <m:t>⟹</m:t>
+                        </m:r>
+                      </m:oMath>
+                    </a14:m>
+                    <a:r>
+                      <a:rPr lang="en-US" altLang="zh-TW" sz="1100" dirty="0">
+                        <a:solidFill>
+                          <a:schemeClr val="tx1"/>
+                        </a:solidFill>
+                      </a:rPr>
+                      <a:t> 962 samples removed</a:t>
+                    </a:r>
+                  </a:p>
+                  <a:p>
+                    <a:pPr marL="372340" indent="-372340" defTabSz="457200">
+                      <a:spcBef>
+                        <a:spcPts val="1300"/>
+                      </a:spcBef>
+                      <a:buSzPct val="150000"/>
+                      <a:buChar char="•"/>
+                      <a:defRPr sz="3000">
+                        <a:latin typeface="Helvetica Neue"/>
+                        <a:ea typeface="Helvetica Neue"/>
+                        <a:cs typeface="Helvetica Neue"/>
+                        <a:sym typeface="Helvetica Neue"/>
+                      </a:defRPr>
+                    </a:pPr>
+                    <a:r>
+                      <a:rPr lang="en-US" altLang="zh-TW" sz="1100" dirty="0">
+                        <a:solidFill>
+                          <a:schemeClr val="tx1"/>
+                        </a:solidFill>
+                      </a:rPr>
+                      <a:t>Relatedness: BOLT-LMM accounts for relatedness structure</a:t>
+                    </a:r>
+                  </a:p>
+                  <a:p>
+                    <a:pPr marL="372340" indent="-372340" defTabSz="457200">
+                      <a:spcBef>
+                        <a:spcPts val="1300"/>
+                      </a:spcBef>
+                      <a:buSzPct val="150000"/>
+                      <a:buChar char="•"/>
+                      <a:defRPr sz="3000">
+                        <a:latin typeface="Helvetica Neue"/>
+                        <a:ea typeface="Helvetica Neue"/>
+                        <a:cs typeface="Helvetica Neue"/>
+                        <a:sym typeface="Helvetica Neue"/>
+                      </a:defRPr>
+                    </a:pPr>
+                    <a:r>
+                      <a:rPr lang="en-US" altLang="zh-TW" sz="1100" dirty="0">
+                        <a:solidFill>
+                          <a:schemeClr val="tx1"/>
+                        </a:solidFill>
+                      </a:rPr>
+                      <a:t>Population stratification: only self-reported white samples included </a:t>
+                    </a:r>
+                    <a14:m>
+                      <m:oMath xmlns:m="http://schemas.openxmlformats.org/officeDocument/2006/math">
+                        <m:r>
+                          <a:rPr lang="en-US" altLang="zh-TW" sz="1100" i="1" smtClean="0">
+                            <a:solidFill>
+                              <a:schemeClr val="tx1"/>
+                            </a:solidFill>
+                            <a:latin typeface="Cambria Math" panose="02040503050406030204" pitchFamily="18" charset="0"/>
+                          </a:rPr>
+                          <m:t>⟹</m:t>
+                        </m:r>
+                      </m:oMath>
+                    </a14:m>
+                    <a:r>
+                      <a:rPr lang="en-US" altLang="zh-TW" sz="1100" dirty="0">
+                        <a:solidFill>
+                          <a:schemeClr val="tx1"/>
+                        </a:solidFill>
+                      </a:rPr>
+                      <a:t> 28,493 samples removed</a:t>
+                    </a:r>
+                  </a:p>
+                </p:txBody>
+              </p:sp>
+            </mc:Choice>
+            <mc:Fallback>
+              <p:sp>
+                <p:nvSpPr>
+                  <p:cNvPr id="128" name="矩形: 圓角 127">
+                    <a:extLst>
+                      <a:ext uri="{FF2B5EF4-FFF2-40B4-BE49-F238E27FC236}">
+                        <a16:creationId xmlns:a16="http://schemas.microsoft.com/office/drawing/2014/main" id="{EE58B19E-AE78-1EAD-AA4B-2EEB89DED163}"/>
+                      </a:ext>
+                    </a:extLst>
+                  </p:cNvPr>
+                  <p:cNvSpPr>
+                    <a:spLocks noRot="1" noChangeAspect="1" noMove="1" noResize="1" noEditPoints="1" noAdjustHandles="1" noChangeArrowheads="1" noChangeShapeType="1" noTextEdit="1"/>
+                  </p:cNvSpPr>
+                  <p:nvPr/>
+                </p:nvSpPr>
+                <p:spPr>
+                  <a:xfrm>
+                    <a:off x="6545736" y="380873"/>
+                    <a:ext cx="5405392" cy="1874332"/>
+                  </a:xfrm>
+                  <a:prstGeom prst="roundRect">
+                    <a:avLst/>
+                  </a:prstGeom>
+                  <a:blipFill>
+                    <a:blip r:embed="rId3"/>
+                    <a:stretch>
+                      <a:fillRect/>
+                    </a:stretch>
+                  </a:blipFill>
+                </p:spPr>
+                <p:txBody>
+                  <a:bodyPr/>
+                  <a:lstStyle/>
+                  <a:p>
+                    <a:r>
+                      <a:rPr lang="zh-TW" altLang="en-US">
+                        <a:noFill/>
+                      </a:rPr>
+                      <a:t> </a:t>
+                    </a:r>
+                  </a:p>
+                </p:txBody>
+              </p:sp>
+            </mc:Fallback>
+          </mc:AlternateContent>
+          <p:sp>
+            <p:nvSpPr>
+              <p:cNvPr id="6" name="文字方塊 5">
+                <a:extLst>
+                  <a:ext uri="{FF2B5EF4-FFF2-40B4-BE49-F238E27FC236}">
+                    <a16:creationId xmlns:a16="http://schemas.microsoft.com/office/drawing/2014/main" id="{7B8B4CE8-533B-74EE-6943-A79181668183}"/>
+                  </a:ext>
+                </a:extLst>
+              </p:cNvPr>
+              <p:cNvSpPr txBox="1"/>
+              <p:nvPr/>
+            </p:nvSpPr>
+            <p:spPr>
+              <a:xfrm>
+                <a:off x="4680278" y="1947427"/>
+                <a:ext cx="1106393" cy="307777"/>
+              </a:xfrm>
+              <a:prstGeom prst="rect">
+                <a:avLst/>
+              </a:prstGeom>
+              <a:noFill/>
+            </p:spPr>
+            <p:txBody>
+              <a:bodyPr wrap="none" rtlCol="0">
+                <a:spAutoFit/>
+              </a:bodyPr>
+              <a:lstStyle/>
+              <a:p>
+                <a:r>
+                  <a:rPr lang="en-US" altLang="zh-TW" sz="1400" b="1" dirty="0"/>
+                  <a:t>Sample QC</a:t>
+                </a:r>
+                <a:endParaRPr lang="zh-TW" altLang="en-US" sz="1400" b="1" dirty="0"/>
+              </a:p>
+            </p:txBody>
+          </p:sp>
+          <p:sp>
+            <p:nvSpPr>
+              <p:cNvPr id="107" name="矩形: 圓角 106">
+                <a:extLst>
+                  <a:ext uri="{FF2B5EF4-FFF2-40B4-BE49-F238E27FC236}">
+                    <a16:creationId xmlns:a16="http://schemas.microsoft.com/office/drawing/2014/main" id="{4D36F4E6-E3A6-4094-8C52-B488583BC650}"/>
+                  </a:ext>
+                </a:extLst>
+              </p:cNvPr>
+              <p:cNvSpPr/>
+              <p:nvPr/>
+            </p:nvSpPr>
+            <p:spPr>
+              <a:xfrm>
+                <a:off x="3555529" y="987453"/>
+                <a:ext cx="1964209" cy="855233"/>
+              </a:xfrm>
+              <a:prstGeom prst="roundRect">
+                <a:avLst/>
+              </a:prstGeom>
+              <a:solidFill>
+                <a:schemeClr val="accent5">
+                  <a:lumMod val="60000"/>
+                  <a:lumOff val="40000"/>
+                </a:schemeClr>
+              </a:solidFill>
+            </p:spPr>
+            <p:style>
+              <a:lnRef idx="2">
+                <a:schemeClr val="accent1">
+                  <a:shade val="15000"/>
+                </a:schemeClr>
+              </a:lnRef>
+              <a:fillRef idx="1">
+                <a:schemeClr val="accent1"/>
+              </a:fillRef>
+              <a:effectRef idx="0">
+                <a:schemeClr val="accent1"/>
+              </a:effectRef>
+              <a:fontRef idx="minor">
+                <a:schemeClr val="lt1"/>
+              </a:fontRef>
+            </p:style>
+            <p:txBody>
+              <a:bodyPr rtlCol="0" anchor="ctr"/>
+              <a:lstStyle/>
+              <a:p>
+                <a:pPr defTabSz="457200">
+                  <a:spcBef>
+                    <a:spcPts val="1300"/>
+                  </a:spcBef>
+                  <a:defRPr sz="3000">
+                    <a:latin typeface="Helvetica Neue"/>
+                    <a:ea typeface="Helvetica Neue"/>
+                    <a:cs typeface="Helvetica Neue"/>
+                    <a:sym typeface="Helvetica Neue"/>
+                  </a:defRPr>
+                </a:pPr>
+                <a:r>
+                  <a:rPr lang="en-US" altLang="zh-TW" sz="1400" dirty="0">
+                    <a:solidFill>
+                      <a:schemeClr val="tx1"/>
+                    </a:solidFill>
+                  </a:rPr>
+                  <a:t>486,935 samples</a:t>
+                </a:r>
+              </a:p>
+              <a:p>
+                <a:pPr defTabSz="457200">
+                  <a:spcBef>
+                    <a:spcPts val="1300"/>
+                  </a:spcBef>
+                  <a:defRPr sz="3000">
+                    <a:latin typeface="Helvetica Neue"/>
+                    <a:ea typeface="Helvetica Neue"/>
+                    <a:cs typeface="Helvetica Neue"/>
+                    <a:sym typeface="Helvetica Neue"/>
+                  </a:defRPr>
+                </a:pPr>
+                <a:r>
+                  <a:rPr lang="en-US" altLang="zh-TW" sz="1400" dirty="0">
+                    <a:solidFill>
+                      <a:schemeClr val="tx1"/>
+                    </a:solidFill>
+                  </a:rPr>
+                  <a:t>231,538,213 variants</a:t>
+                </a:r>
+              </a:p>
+            </p:txBody>
+          </p:sp>
+          <p:sp>
+            <p:nvSpPr>
+              <p:cNvPr id="109" name="矩形: 圓角 108">
+                <a:extLst>
+                  <a:ext uri="{FF2B5EF4-FFF2-40B4-BE49-F238E27FC236}">
+                    <a16:creationId xmlns:a16="http://schemas.microsoft.com/office/drawing/2014/main" id="{E30226F9-C4B1-4495-0AC5-49F3E5383E2B}"/>
+                  </a:ext>
+                </a:extLst>
+              </p:cNvPr>
+              <p:cNvSpPr/>
+              <p:nvPr/>
+            </p:nvSpPr>
+            <p:spPr>
+              <a:xfrm>
+                <a:off x="3555526" y="3315588"/>
+                <a:ext cx="1964209" cy="855233"/>
+              </a:xfrm>
+              <a:prstGeom prst="roundRect">
+                <a:avLst/>
+              </a:prstGeom>
+              <a:solidFill>
+                <a:schemeClr val="accent5">
+                  <a:lumMod val="60000"/>
+                  <a:lumOff val="40000"/>
+                </a:schemeClr>
+              </a:solidFill>
+            </p:spPr>
+            <p:style>
+              <a:lnRef idx="2">
+                <a:schemeClr val="accent1">
+                  <a:shade val="15000"/>
+                </a:schemeClr>
+              </a:lnRef>
+              <a:fillRef idx="1">
+                <a:schemeClr val="accent1"/>
+              </a:fillRef>
+              <a:effectRef idx="0">
+                <a:schemeClr val="accent1"/>
+              </a:effectRef>
+              <a:fontRef idx="minor">
+                <a:schemeClr val="lt1"/>
+              </a:fontRef>
+            </p:style>
+            <p:txBody>
+              <a:bodyPr rtlCol="0" anchor="ctr"/>
+              <a:lstStyle/>
+              <a:p>
+                <a:pPr defTabSz="457200">
+                  <a:spcBef>
+                    <a:spcPts val="1300"/>
+                  </a:spcBef>
+                  <a:defRPr sz="3000">
+                    <a:latin typeface="Helvetica Neue"/>
+                    <a:ea typeface="Helvetica Neue"/>
+                    <a:cs typeface="Helvetica Neue"/>
+                    <a:sym typeface="Helvetica Neue"/>
+                  </a:defRPr>
+                </a:pPr>
+                <a:r>
+                  <a:rPr lang="en-US" altLang="zh-TW" sz="1400" dirty="0">
+                    <a:solidFill>
+                      <a:schemeClr val="tx1"/>
+                    </a:solidFill>
+                  </a:rPr>
+                  <a:t>457,030 samples</a:t>
+                </a:r>
+              </a:p>
+              <a:p>
+                <a:pPr defTabSz="457200">
+                  <a:spcBef>
+                    <a:spcPts val="1300"/>
+                  </a:spcBef>
+                  <a:defRPr sz="3000">
+                    <a:latin typeface="Helvetica Neue"/>
+                    <a:ea typeface="Helvetica Neue"/>
+                    <a:cs typeface="Helvetica Neue"/>
+                    <a:sym typeface="Helvetica Neue"/>
+                  </a:defRPr>
+                </a:pPr>
+                <a:r>
+                  <a:rPr lang="en-US" altLang="zh-TW" sz="1400" dirty="0">
+                    <a:solidFill>
+                      <a:schemeClr val="tx1"/>
+                    </a:solidFill>
+                  </a:rPr>
+                  <a:t>7,559,516 variants</a:t>
+                </a:r>
+              </a:p>
+            </p:txBody>
+          </p:sp>
+          <p:sp>
+            <p:nvSpPr>
+              <p:cNvPr id="110" name="矩形: 圓角 109">
+                <a:extLst>
+                  <a:ext uri="{FF2B5EF4-FFF2-40B4-BE49-F238E27FC236}">
+                    <a16:creationId xmlns:a16="http://schemas.microsoft.com/office/drawing/2014/main" id="{9B009EEE-72BD-12CE-1E14-0A491CE59682}"/>
+                  </a:ext>
+                </a:extLst>
+              </p:cNvPr>
+              <p:cNvSpPr/>
+              <p:nvPr/>
+            </p:nvSpPr>
+            <p:spPr>
+              <a:xfrm>
+                <a:off x="3550762" y="5179142"/>
+                <a:ext cx="1964209" cy="855233"/>
+              </a:xfrm>
+              <a:prstGeom prst="roundRect">
+                <a:avLst/>
+              </a:prstGeom>
+              <a:solidFill>
+                <a:schemeClr val="accent5">
+                  <a:lumMod val="60000"/>
+                  <a:lumOff val="40000"/>
+                </a:schemeClr>
+              </a:solidFill>
+            </p:spPr>
+            <p:style>
+              <a:lnRef idx="2">
+                <a:schemeClr val="accent1">
+                  <a:shade val="15000"/>
+                </a:schemeClr>
+              </a:lnRef>
+              <a:fillRef idx="1">
+                <a:schemeClr val="accent1"/>
+              </a:fillRef>
+              <a:effectRef idx="0">
+                <a:schemeClr val="accent1"/>
+              </a:effectRef>
+              <a:fontRef idx="minor">
+                <a:schemeClr val="lt1"/>
+              </a:fontRef>
+            </p:style>
+            <p:txBody>
+              <a:bodyPr rtlCol="0" anchor="ctr"/>
+              <a:lstStyle/>
+              <a:p>
+                <a:pPr defTabSz="457200">
+                  <a:spcBef>
+                    <a:spcPts val="1300"/>
+                  </a:spcBef>
+                  <a:defRPr sz="3000">
+                    <a:latin typeface="Helvetica Neue"/>
+                    <a:ea typeface="Helvetica Neue"/>
+                    <a:cs typeface="Helvetica Neue"/>
+                    <a:sym typeface="Helvetica Neue"/>
+                  </a:defRPr>
+                </a:pPr>
+                <a:r>
+                  <a:rPr lang="en-US" altLang="zh-TW" sz="1400" dirty="0">
+                    <a:solidFill>
+                      <a:schemeClr val="tx1"/>
+                    </a:solidFill>
+                  </a:rPr>
+                  <a:t>159,243 samples</a:t>
+                </a:r>
+              </a:p>
+              <a:p>
+                <a:pPr defTabSz="457200">
+                  <a:spcBef>
+                    <a:spcPts val="1300"/>
+                  </a:spcBef>
+                  <a:defRPr sz="3000">
+                    <a:latin typeface="Helvetica Neue"/>
+                    <a:ea typeface="Helvetica Neue"/>
+                    <a:cs typeface="Helvetica Neue"/>
+                    <a:sym typeface="Helvetica Neue"/>
+                  </a:defRPr>
+                </a:pPr>
+                <a:r>
+                  <a:rPr lang="en-US" altLang="zh-TW" sz="1400" dirty="0">
+                    <a:solidFill>
+                      <a:schemeClr val="tx1"/>
+                    </a:solidFill>
+                  </a:rPr>
+                  <a:t>7,559,516 variants</a:t>
+                </a:r>
+              </a:p>
+            </p:txBody>
+          </p:sp>
+          <p:cxnSp>
+            <p:nvCxnSpPr>
+              <p:cNvPr id="111" name="直線單箭頭接點 110">
+                <a:extLst>
+                  <a:ext uri="{FF2B5EF4-FFF2-40B4-BE49-F238E27FC236}">
+                    <a16:creationId xmlns:a16="http://schemas.microsoft.com/office/drawing/2014/main" id="{0DD4BCBC-B859-8F0A-93F4-4EA54D079B9D}"/>
+                  </a:ext>
+                </a:extLst>
+              </p:cNvPr>
+              <p:cNvCxnSpPr>
+                <a:cxnSpLocks/>
+                <a:stCxn id="107" idx="2"/>
+                <a:endCxn id="109" idx="0"/>
+              </p:cNvCxnSpPr>
+              <p:nvPr/>
+            </p:nvCxnSpPr>
+            <p:spPr>
+              <a:xfrm flipH="1">
+                <a:off x="4537631" y="1842686"/>
+                <a:ext cx="3" cy="1472902"/>
+              </a:xfrm>
+              <a:prstGeom prst="straightConnector1">
+                <a:avLst/>
+              </a:prstGeom>
+              <a:ln>
+                <a:tailEnd type="triangle"/>
+              </a:ln>
+            </p:spPr>
+            <p:style>
+              <a:lnRef idx="2">
+                <a:schemeClr val="dk1"/>
+              </a:lnRef>
+              <a:fillRef idx="0">
+                <a:schemeClr val="dk1"/>
+              </a:fillRef>
+              <a:effectRef idx="1">
+                <a:schemeClr val="dk1"/>
+              </a:effectRef>
+              <a:fontRef idx="minor">
+                <a:schemeClr val="tx1"/>
+              </a:fontRef>
+            </p:style>
+          </p:cxnSp>
+          <p:cxnSp>
+            <p:nvCxnSpPr>
+              <p:cNvPr id="115" name="直線單箭頭接點 114">
+                <a:extLst>
+                  <a:ext uri="{FF2B5EF4-FFF2-40B4-BE49-F238E27FC236}">
+                    <a16:creationId xmlns:a16="http://schemas.microsoft.com/office/drawing/2014/main" id="{EEFBE59B-4D95-7243-8961-F4C449EC5802}"/>
+                  </a:ext>
+                </a:extLst>
+              </p:cNvPr>
+              <p:cNvCxnSpPr>
+                <a:cxnSpLocks/>
+                <a:stCxn id="109" idx="2"/>
+                <a:endCxn id="110" idx="0"/>
+              </p:cNvCxnSpPr>
+              <p:nvPr/>
+            </p:nvCxnSpPr>
+            <p:spPr>
+              <a:xfrm flipH="1">
+                <a:off x="4532867" y="4170821"/>
+                <a:ext cx="4764" cy="1008321"/>
+              </a:xfrm>
+              <a:prstGeom prst="straightConnector1">
+                <a:avLst/>
+              </a:prstGeom>
+              <a:ln>
+                <a:tailEnd type="triangle"/>
+              </a:ln>
+            </p:spPr>
+            <p:style>
+              <a:lnRef idx="2">
+                <a:schemeClr val="dk1"/>
+              </a:lnRef>
+              <a:fillRef idx="0">
+                <a:schemeClr val="dk1"/>
+              </a:fillRef>
+              <a:effectRef idx="1">
+                <a:schemeClr val="dk1"/>
+              </a:effectRef>
+              <a:fontRef idx="minor">
+                <a:schemeClr val="tx1"/>
+              </a:fontRef>
+            </p:style>
+          </p:cxnSp>
+          <p:sp>
+            <p:nvSpPr>
+              <p:cNvPr id="119" name="橢圓 118">
+                <a:extLst>
+                  <a:ext uri="{FF2B5EF4-FFF2-40B4-BE49-F238E27FC236}">
+                    <a16:creationId xmlns:a16="http://schemas.microsoft.com/office/drawing/2014/main" id="{94F7059F-CA36-3A72-4EC1-47BA5343628D}"/>
+                  </a:ext>
+                </a:extLst>
+              </p:cNvPr>
+              <p:cNvSpPr/>
+              <p:nvPr/>
+            </p:nvSpPr>
+            <p:spPr>
+              <a:xfrm>
+                <a:off x="4412267" y="2135268"/>
+                <a:ext cx="241200" cy="239873"/>
+              </a:xfrm>
+              <a:prstGeom prst="ellipse">
+                <a:avLst/>
+              </a:prstGeom>
+              <a:solidFill>
+                <a:schemeClr val="bg1"/>
+              </a:solidFill>
+            </p:spPr>
+            <p:style>
+              <a:lnRef idx="2">
+                <a:schemeClr val="accent1">
+                  <a:shade val="15000"/>
+                </a:schemeClr>
+              </a:lnRef>
+              <a:fillRef idx="1">
+                <a:schemeClr val="accent1"/>
+              </a:fillRef>
+              <a:effectRef idx="0">
+                <a:schemeClr val="accent1"/>
+              </a:effectRef>
+              <a:fontRef idx="minor">
+                <a:schemeClr val="lt1"/>
+              </a:fontRef>
+            </p:style>
+            <p:txBody>
+              <a:bodyPr rtlCol="0" anchor="ctr"/>
+              <a:lstStyle/>
+              <a:p>
+                <a:pPr algn="ctr"/>
+                <a:endParaRPr lang="zh-TW" altLang="en-US"/>
+              </a:p>
+            </p:txBody>
+          </p:sp>
+          <p:sp>
+            <p:nvSpPr>
+              <p:cNvPr id="120" name="橢圓 119">
+                <a:extLst>
+                  <a:ext uri="{FF2B5EF4-FFF2-40B4-BE49-F238E27FC236}">
+                    <a16:creationId xmlns:a16="http://schemas.microsoft.com/office/drawing/2014/main" id="{6F47D02E-A8BC-EDF6-B6C3-28BB24CC2609}"/>
+                  </a:ext>
+                </a:extLst>
+              </p:cNvPr>
+              <p:cNvSpPr/>
+              <p:nvPr/>
+            </p:nvSpPr>
+            <p:spPr>
+              <a:xfrm>
+                <a:off x="4412267" y="2714102"/>
+                <a:ext cx="241200" cy="239873"/>
+              </a:xfrm>
+              <a:prstGeom prst="ellipse">
+                <a:avLst/>
+              </a:prstGeom>
+              <a:solidFill>
+                <a:schemeClr val="bg1"/>
+              </a:solidFill>
+            </p:spPr>
+            <p:style>
+              <a:lnRef idx="2">
+                <a:schemeClr val="accent1">
+                  <a:shade val="15000"/>
+                </a:schemeClr>
+              </a:lnRef>
+              <a:fillRef idx="1">
+                <a:schemeClr val="accent1"/>
+              </a:fillRef>
+              <a:effectRef idx="0">
+                <a:schemeClr val="accent1"/>
+              </a:effectRef>
+              <a:fontRef idx="minor">
+                <a:schemeClr val="lt1"/>
+              </a:fontRef>
+            </p:style>
+            <p:txBody>
+              <a:bodyPr rtlCol="0" anchor="ctr"/>
+              <a:lstStyle/>
+              <a:p>
+                <a:pPr algn="ctr"/>
+                <a:endParaRPr lang="zh-TW" altLang="en-US"/>
+              </a:p>
+            </p:txBody>
+          </p:sp>
+          <p:cxnSp>
+            <p:nvCxnSpPr>
+              <p:cNvPr id="122" name="接點: 肘形 121">
+                <a:extLst>
+                  <a:ext uri="{FF2B5EF4-FFF2-40B4-BE49-F238E27FC236}">
+                    <a16:creationId xmlns:a16="http://schemas.microsoft.com/office/drawing/2014/main" id="{FD02CFF9-6993-B72F-55B0-1E73FF6A56D7}"/>
+                  </a:ext>
+                </a:extLst>
+              </p:cNvPr>
+              <p:cNvCxnSpPr>
+                <a:cxnSpLocks/>
+                <a:stCxn id="119" idx="6"/>
+              </p:cNvCxnSpPr>
+              <p:nvPr/>
+            </p:nvCxnSpPr>
+            <p:spPr>
+              <a:xfrm flipV="1">
+                <a:off x="4653467" y="987453"/>
+                <a:ext cx="1896629" cy="1267752"/>
+              </a:xfrm>
+              <a:prstGeom prst="bentConnector3">
+                <a:avLst>
+                  <a:gd name="adj1" fmla="val 63811"/>
+                </a:avLst>
+              </a:prstGeom>
+            </p:spPr>
+            <p:style>
+              <a:lnRef idx="2">
+                <a:schemeClr val="dk1"/>
+              </a:lnRef>
+              <a:fillRef idx="0">
+                <a:schemeClr val="dk1"/>
+              </a:fillRef>
+              <a:effectRef idx="1">
+                <a:schemeClr val="dk1"/>
+              </a:effectRef>
+              <a:fontRef idx="minor">
+                <a:schemeClr val="tx1"/>
+              </a:fontRef>
+            </p:style>
+          </p:cxnSp>
+          <mc:AlternateContent xmlns:mc="http://schemas.openxmlformats.org/markup-compatibility/2006">
+            <mc:Choice xmlns:a14="http://schemas.microsoft.com/office/drawing/2010/main" Requires="a14">
+              <p:sp>
+                <p:nvSpPr>
+                  <p:cNvPr id="129" name="矩形: 圓角 128">
+                    <a:extLst>
+                      <a:ext uri="{FF2B5EF4-FFF2-40B4-BE49-F238E27FC236}">
+                        <a16:creationId xmlns:a16="http://schemas.microsoft.com/office/drawing/2014/main" id="{F32C1CA4-A51E-4F36-E9D9-A37ED8586D2E}"/>
+                      </a:ext>
+                    </a:extLst>
+                  </p:cNvPr>
+                  <p:cNvSpPr/>
+                  <p:nvPr/>
+                </p:nvSpPr>
+                <p:spPr>
+                  <a:xfrm>
+                    <a:off x="6579074" y="2491834"/>
+                    <a:ext cx="5405392" cy="1756316"/>
+                  </a:xfrm>
+                  <a:prstGeom prst="roundRect">
+                    <a:avLst/>
+                  </a:prstGeom>
+                  <a:solidFill>
+                    <a:schemeClr val="bg1"/>
+                  </a:solidFill>
+                </p:spPr>
+                <p:style>
+                  <a:lnRef idx="2">
+                    <a:schemeClr val="accent1">
+                      <a:shade val="15000"/>
+                    </a:schemeClr>
+                  </a:lnRef>
+                  <a:fillRef idx="1">
+                    <a:schemeClr val="accent1"/>
+                  </a:fillRef>
+                  <a:effectRef idx="0">
+                    <a:schemeClr val="accent1"/>
+                  </a:effectRef>
+                  <a:fontRef idx="minor">
+                    <a:schemeClr val="lt1"/>
+                  </a:fontRef>
+                </p:style>
+                <p:txBody>
+                  <a:bodyPr rtlCol="0" anchor="ctr"/>
+                  <a:lstStyle/>
+                  <a:p>
+                    <a:pPr marL="372340" indent="-372340" defTabSz="457200">
+                      <a:spcBef>
+                        <a:spcPts val="1300"/>
+                      </a:spcBef>
+                      <a:buSzPct val="150000"/>
+                      <a:buChar char="•"/>
+                      <a:defRPr sz="3000">
+                        <a:latin typeface="Helvetica Neue"/>
+                        <a:ea typeface="Helvetica Neue"/>
+                        <a:cs typeface="Helvetica Neue"/>
+                        <a:sym typeface="Helvetica Neue"/>
+                      </a:defRPr>
+                    </a:pPr>
+                    <a:r>
+                      <a:rPr lang="en-US" altLang="zh-TW" sz="1100" dirty="0">
+                        <a:solidFill>
+                          <a:schemeClr val="tx1"/>
+                        </a:solidFill>
+                      </a:rPr>
+                      <a:t>Info &lt;0.8 </a:t>
+                    </a:r>
+                    <a14:m>
+                      <m:oMath xmlns:m="http://schemas.openxmlformats.org/officeDocument/2006/math">
+                        <m:r>
+                          <a:rPr lang="en-US" altLang="zh-TW" sz="1200" i="1" smtClean="0">
+                            <a:solidFill>
+                              <a:schemeClr val="tx1"/>
+                            </a:solidFill>
+                            <a:latin typeface="Cambria Math" panose="02040503050406030204" pitchFamily="18" charset="0"/>
+                          </a:rPr>
+                          <m:t>⟹</m:t>
+                        </m:r>
+                      </m:oMath>
+                    </a14:m>
+                    <a:r>
+                      <a:rPr lang="en-US" altLang="zh-TW" sz="1100" dirty="0">
+                        <a:solidFill>
+                          <a:schemeClr val="tx1"/>
+                        </a:solidFill>
+                      </a:rPr>
+                      <a:t> 144,557,358 variants removed </a:t>
+                    </a:r>
+                  </a:p>
+                  <a:p>
+                    <a:pPr marL="372340" indent="-372340" defTabSz="457200">
+                      <a:spcBef>
+                        <a:spcPts val="1300"/>
+                      </a:spcBef>
+                      <a:buSzPct val="150000"/>
+                      <a:buChar char="•"/>
+                      <a:defRPr sz="3000">
+                        <a:latin typeface="Helvetica Neue"/>
+                        <a:ea typeface="Helvetica Neue"/>
+                        <a:cs typeface="Helvetica Neue"/>
+                        <a:sym typeface="Helvetica Neue"/>
+                      </a:defRPr>
+                    </a:pPr>
+                    <a:r>
+                      <a:rPr lang="en-US" altLang="zh-TW" sz="1100" dirty="0" err="1">
+                        <a:solidFill>
+                          <a:schemeClr val="tx1"/>
+                        </a:solidFill>
+                      </a:rPr>
+                      <a:t>Maf</a:t>
+                    </a:r>
+                    <a:r>
+                      <a:rPr lang="en-US" altLang="zh-TW" sz="1100" dirty="0">
+                        <a:solidFill>
+                          <a:schemeClr val="tx1"/>
+                        </a:solidFill>
+                      </a:rPr>
+                      <a:t> &lt; 0.01 </a:t>
+                    </a:r>
+                    <a14:m>
+                      <m:oMath xmlns:m="http://schemas.openxmlformats.org/officeDocument/2006/math">
+                        <m:r>
+                          <a:rPr lang="en-US" altLang="zh-TW" sz="1200" i="1" smtClean="0">
+                            <a:solidFill>
+                              <a:schemeClr val="tx1"/>
+                            </a:solidFill>
+                            <a:latin typeface="Cambria Math" panose="02040503050406030204" pitchFamily="18" charset="0"/>
+                          </a:rPr>
+                          <m:t>⟹</m:t>
+                        </m:r>
+                      </m:oMath>
+                    </a14:m>
+                    <a:r>
+                      <a:rPr lang="en-US" altLang="zh-TW" sz="1100" dirty="0">
+                        <a:solidFill>
+                          <a:schemeClr val="tx1"/>
+                        </a:solidFill>
+                      </a:rPr>
+                      <a:t> 67,589,102 variants removed </a:t>
+                    </a:r>
+                  </a:p>
+                  <a:p>
+                    <a:pPr marL="372340" indent="-372340" defTabSz="457200">
+                      <a:spcBef>
+                        <a:spcPts val="1300"/>
+                      </a:spcBef>
+                      <a:buSzPct val="150000"/>
+                      <a:buChar char="•"/>
+                      <a:defRPr sz="3000">
+                        <a:latin typeface="Helvetica Neue"/>
+                        <a:ea typeface="Helvetica Neue"/>
+                        <a:cs typeface="Helvetica Neue"/>
+                        <a:sym typeface="Helvetica Neue"/>
+                      </a:defRPr>
+                    </a:pPr>
+                    <a:r>
+                      <a:rPr lang="en-US" altLang="zh-TW" sz="1100" dirty="0">
+                        <a:solidFill>
+                          <a:schemeClr val="tx1"/>
+                        </a:solidFill>
+                      </a:rPr>
+                      <a:t>Missing genotype &gt; 0.02 </a:t>
+                    </a:r>
+                    <a14:m>
+                      <m:oMath xmlns:m="http://schemas.openxmlformats.org/officeDocument/2006/math">
+                        <m:r>
+                          <a:rPr lang="en-US" altLang="zh-TW" sz="1200" i="1" smtClean="0">
+                            <a:solidFill>
+                              <a:schemeClr val="tx1"/>
+                            </a:solidFill>
+                            <a:latin typeface="Cambria Math" panose="02040503050406030204" pitchFamily="18" charset="0"/>
+                          </a:rPr>
+                          <m:t>⟹</m:t>
+                        </m:r>
+                      </m:oMath>
+                    </a14:m>
+                    <a:r>
+                      <a:rPr lang="en-US" altLang="zh-TW" sz="1100" dirty="0">
+                        <a:solidFill>
+                          <a:schemeClr val="tx1"/>
+                        </a:solidFill>
+                      </a:rPr>
+                      <a:t> 1,103,122 variants removed</a:t>
+                    </a:r>
+                  </a:p>
+                  <a:p>
+                    <a:pPr marL="372340" indent="-372340" defTabSz="457200">
+                      <a:spcBef>
+                        <a:spcPts val="1300"/>
+                      </a:spcBef>
+                      <a:buSzPct val="150000"/>
+                      <a:buChar char="•"/>
+                      <a:defRPr sz="3000">
+                        <a:latin typeface="Helvetica Neue"/>
+                        <a:ea typeface="Helvetica Neue"/>
+                        <a:cs typeface="Helvetica Neue"/>
+                        <a:sym typeface="Helvetica Neue"/>
+                      </a:defRPr>
+                    </a:pPr>
+                    <a:r>
+                      <a:rPr lang="en-US" altLang="zh-TW" sz="1100" dirty="0">
+                        <a:solidFill>
+                          <a:schemeClr val="tx1"/>
+                        </a:solidFill>
+                      </a:rPr>
+                      <a:t>Hardy-Weinberg &lt; </a:t>
+                    </a:r>
+                    <a14:m>
+                      <m:oMath xmlns:m="http://schemas.openxmlformats.org/officeDocument/2006/math">
+                        <m:r>
+                          <a:rPr lang="zh-TW" altLang="en-US" sz="1200" i="1" smtClean="0">
+                            <a:solidFill>
+                              <a:schemeClr val="tx1"/>
+                            </a:solidFill>
+                            <a:latin typeface="Cambria Math" panose="02040503050406030204" pitchFamily="18" charset="0"/>
+                          </a:rPr>
+                          <m:t>𝟣</m:t>
+                        </m:r>
+                        <m:r>
+                          <a:rPr lang="en-US" altLang="zh-TW" sz="1200" i="1" smtClean="0">
+                            <a:solidFill>
+                              <a:schemeClr val="tx1"/>
+                            </a:solidFill>
+                            <a:latin typeface="Cambria Math" panose="02040503050406030204" pitchFamily="18" charset="0"/>
+                          </a:rPr>
+                          <m:t>×</m:t>
+                        </m:r>
+                        <m:sSup>
+                          <m:sSupPr>
+                            <m:ctrlPr>
+                              <a:rPr lang="ar-AE" altLang="zh-TW" sz="1200" i="1">
+                                <a:solidFill>
+                                  <a:schemeClr val="tx1"/>
+                                </a:solidFill>
+                                <a:latin typeface="Cambria Math" panose="02040503050406030204" pitchFamily="18" charset="0"/>
+                              </a:rPr>
+                            </m:ctrlPr>
+                          </m:sSupPr>
+                          <m:e>
+                            <m:r>
+                              <a:rPr lang="zh-TW" altLang="ar-AE" sz="1200" i="1" smtClean="0">
+                                <a:solidFill>
+                                  <a:schemeClr val="tx1"/>
+                                </a:solidFill>
+                                <a:latin typeface="Cambria Math" panose="02040503050406030204" pitchFamily="18" charset="0"/>
+                              </a:rPr>
+                              <m:t>𝟣𝟢</m:t>
+                            </m:r>
+                          </m:e>
+                          <m:sup>
+                            <m:r>
+                              <a:rPr lang="ar-AE" altLang="zh-TW" sz="1200" i="1" smtClean="0">
+                                <a:solidFill>
+                                  <a:schemeClr val="tx1"/>
+                                </a:solidFill>
+                                <a:latin typeface="Cambria Math" panose="02040503050406030204" pitchFamily="18" charset="0"/>
+                              </a:rPr>
+                              <m:t>−</m:t>
+                            </m:r>
+                            <m:r>
+                              <a:rPr lang="zh-TW" altLang="ar-AE" sz="1200" i="1" smtClean="0">
+                                <a:solidFill>
+                                  <a:schemeClr val="tx1"/>
+                                </a:solidFill>
+                                <a:latin typeface="Cambria Math" panose="02040503050406030204" pitchFamily="18" charset="0"/>
+                              </a:rPr>
+                              <m:t>𝟨</m:t>
+                            </m:r>
+                          </m:sup>
+                        </m:sSup>
+                      </m:oMath>
+                    </a14:m>
+                    <a:r>
+                      <a:rPr lang="ar-AE" altLang="zh-TW" sz="1100" dirty="0">
+                        <a:solidFill>
+                          <a:schemeClr val="tx1"/>
+                        </a:solidFill>
+                      </a:rPr>
+                      <a:t> </a:t>
+                    </a:r>
+                    <a14:m>
+                      <m:oMath xmlns:m="http://schemas.openxmlformats.org/officeDocument/2006/math">
+                        <m:r>
+                          <a:rPr lang="ar-AE" altLang="zh-TW" sz="1200" i="1" smtClean="0">
+                            <a:solidFill>
+                              <a:schemeClr val="tx1"/>
+                            </a:solidFill>
+                            <a:latin typeface="Cambria Math" panose="02040503050406030204" pitchFamily="18" charset="0"/>
+                          </a:rPr>
+                          <m:t>⟹</m:t>
+                        </m:r>
+                      </m:oMath>
+                    </a14:m>
+                    <a:r>
+                      <a:rPr lang="ar-AE" altLang="zh-TW" sz="1100" dirty="0">
+                        <a:solidFill>
+                          <a:schemeClr val="tx1"/>
+                        </a:solidFill>
+                      </a:rPr>
+                      <a:t> 24,920 </a:t>
+                    </a:r>
+                    <a:r>
+                      <a:rPr lang="en-US" altLang="zh-TW" sz="1100" dirty="0">
+                        <a:solidFill>
+                          <a:schemeClr val="tx1"/>
+                        </a:solidFill>
+                      </a:rPr>
+                      <a:t>variants removed</a:t>
+                    </a:r>
+                  </a:p>
+                </p:txBody>
+              </p:sp>
+            </mc:Choice>
+            <mc:Fallback>
+              <p:sp>
+                <p:nvSpPr>
+                  <p:cNvPr id="129" name="矩形: 圓角 128">
+                    <a:extLst>
+                      <a:ext uri="{FF2B5EF4-FFF2-40B4-BE49-F238E27FC236}">
+                        <a16:creationId xmlns:a16="http://schemas.microsoft.com/office/drawing/2014/main" id="{F32C1CA4-A51E-4F36-E9D9-A37ED8586D2E}"/>
+                      </a:ext>
+                    </a:extLst>
+                  </p:cNvPr>
+                  <p:cNvSpPr>
+                    <a:spLocks noRot="1" noChangeAspect="1" noMove="1" noResize="1" noEditPoints="1" noAdjustHandles="1" noChangeArrowheads="1" noChangeShapeType="1" noTextEdit="1"/>
+                  </p:cNvSpPr>
+                  <p:nvPr/>
+                </p:nvSpPr>
+                <p:spPr>
+                  <a:xfrm>
+                    <a:off x="6579074" y="2491834"/>
+                    <a:ext cx="5405392" cy="1756316"/>
+                  </a:xfrm>
+                  <a:prstGeom prst="roundRect">
+                    <a:avLst/>
+                  </a:prstGeom>
+                  <a:blipFill>
+                    <a:blip r:embed="rId4"/>
+                    <a:stretch>
+                      <a:fillRect/>
+                    </a:stretch>
+                  </a:blipFill>
+                </p:spPr>
+                <p:txBody>
+                  <a:bodyPr/>
+                  <a:lstStyle/>
+                  <a:p>
+                    <a:r>
+                      <a:rPr lang="zh-TW" altLang="en-US">
+                        <a:noFill/>
+                      </a:rPr>
+                      <a:t> </a:t>
+                    </a:r>
+                  </a:p>
+                </p:txBody>
+              </p:sp>
+            </mc:Fallback>
+          </mc:AlternateContent>
+          <p:cxnSp>
+            <p:nvCxnSpPr>
+              <p:cNvPr id="130" name="接點: 肘形 129">
+                <a:extLst>
+                  <a:ext uri="{FF2B5EF4-FFF2-40B4-BE49-F238E27FC236}">
+                    <a16:creationId xmlns:a16="http://schemas.microsoft.com/office/drawing/2014/main" id="{332316D8-5169-D78E-1557-5A985ACF452A}"/>
+                  </a:ext>
+                </a:extLst>
+              </p:cNvPr>
+              <p:cNvCxnSpPr>
+                <a:cxnSpLocks/>
+                <a:stCxn id="120" idx="6"/>
+                <a:endCxn id="129" idx="1"/>
+              </p:cNvCxnSpPr>
+              <p:nvPr/>
+            </p:nvCxnSpPr>
+            <p:spPr>
+              <a:xfrm>
+                <a:off x="4653467" y="2834039"/>
+                <a:ext cx="1925607" cy="535953"/>
+              </a:xfrm>
+              <a:prstGeom prst="bentConnector3">
+                <a:avLst>
+                  <a:gd name="adj1" fmla="val 50000"/>
+                </a:avLst>
+              </a:prstGeom>
+            </p:spPr>
+            <p:style>
+              <a:lnRef idx="2">
+                <a:schemeClr val="dk1"/>
+              </a:lnRef>
+              <a:fillRef idx="0">
+                <a:schemeClr val="dk1"/>
+              </a:fillRef>
+              <a:effectRef idx="1">
+                <a:schemeClr val="dk1"/>
+              </a:effectRef>
+              <a:fontRef idx="minor">
+                <a:schemeClr val="tx1"/>
+              </a:fontRef>
+            </p:style>
+          </p:cxnSp>
+          <p:sp>
+            <p:nvSpPr>
+              <p:cNvPr id="140" name="文字方塊 139">
+                <a:extLst>
+                  <a:ext uri="{FF2B5EF4-FFF2-40B4-BE49-F238E27FC236}">
+                    <a16:creationId xmlns:a16="http://schemas.microsoft.com/office/drawing/2014/main" id="{AE949E78-DE13-09A4-6233-B6B71DC09A5F}"/>
+                  </a:ext>
+                </a:extLst>
+              </p:cNvPr>
+              <p:cNvSpPr txBox="1"/>
+              <p:nvPr/>
+            </p:nvSpPr>
+            <p:spPr>
+              <a:xfrm>
+                <a:off x="2087219" y="4449958"/>
+                <a:ext cx="2523982" cy="523220"/>
+              </a:xfrm>
+              <a:prstGeom prst="rect">
+                <a:avLst/>
+              </a:prstGeom>
+              <a:noFill/>
+            </p:spPr>
+            <p:txBody>
+              <a:bodyPr wrap="square" rtlCol="0">
+                <a:spAutoFit/>
+              </a:bodyPr>
+              <a:lstStyle/>
+              <a:p>
+                <a:r>
+                  <a:rPr lang="en-US" altLang="zh-TW" sz="1400" b="1" dirty="0"/>
+                  <a:t>Participants with BRS score and baseline covariates</a:t>
+                </a:r>
+              </a:p>
+            </p:txBody>
+          </p:sp>
+          <p:sp>
+            <p:nvSpPr>
+              <p:cNvPr id="141" name="文字方塊 140">
+                <a:extLst>
+                  <a:ext uri="{FF2B5EF4-FFF2-40B4-BE49-F238E27FC236}">
+                    <a16:creationId xmlns:a16="http://schemas.microsoft.com/office/drawing/2014/main" id="{6EB0C335-ADF3-2F25-6FBF-E44529253DDA}"/>
+                  </a:ext>
+                </a:extLst>
+              </p:cNvPr>
+              <p:cNvSpPr txBox="1"/>
+              <p:nvPr/>
+            </p:nvSpPr>
+            <p:spPr>
+              <a:xfrm>
+                <a:off x="4803090" y="2537587"/>
+                <a:ext cx="827471" cy="307777"/>
+              </a:xfrm>
+              <a:prstGeom prst="rect">
+                <a:avLst/>
+              </a:prstGeom>
+              <a:noFill/>
+            </p:spPr>
+            <p:txBody>
+              <a:bodyPr wrap="none" rtlCol="0">
+                <a:spAutoFit/>
+              </a:bodyPr>
+              <a:lstStyle/>
+              <a:p>
+                <a:r>
+                  <a:rPr lang="en-US" altLang="zh-TW" sz="1400" b="1" dirty="0"/>
+                  <a:t>SNP QC</a:t>
+                </a:r>
+                <a:endParaRPr lang="zh-TW" altLang="en-US" sz="1400" b="1" dirty="0"/>
+              </a:p>
+            </p:txBody>
+          </p:sp>
+        </p:grpSp>
         <p:sp>
           <p:nvSpPr>
-            <p:cNvPr id="107" name="矩形: 圓角 106">
+            <p:cNvPr id="143" name="矩形: 圓角 142">
               <a:extLst>
                 <a:ext uri="{FF2B5EF4-FFF2-40B4-BE49-F238E27FC236}">
-                  <a16:creationId xmlns:a16="http://schemas.microsoft.com/office/drawing/2014/main" id="{4D36F4E6-E3A6-4094-8C52-B488583BC650}"/>
+                  <a16:creationId xmlns:a16="http://schemas.microsoft.com/office/drawing/2014/main" id="{231EA7D0-4488-34D5-DF19-F208163C1FA1}"/>
                 </a:ext>
               </a:extLst>
             </p:cNvPr>
@@ -6251,8 +7238,8 @@
           </p:nvSpPr>
           <p:spPr>
             <a:xfrm>
-              <a:off x="3555529" y="987453"/>
-              <a:ext cx="1964209" cy="855233"/>
+              <a:off x="7960838" y="4526633"/>
+              <a:ext cx="1964209" cy="893091"/>
             </a:xfrm>
             <a:prstGeom prst="roundRect">
               <a:avLst/>
@@ -6301,7 +7288,7 @@
                     <a:schemeClr val="tx1"/>
                   </a:solidFill>
                 </a:rPr>
-                <a:t>486,935 samples</a:t>
+                <a:t>GWAS cohort</a:t>
               </a:r>
             </a:p>
             <a:p>
@@ -6322,17 +7309,17 @@
                     <a:schemeClr val="tx1"/>
                   </a:solidFill>
                 </a:rPr>
-                <a:t>231,538,213 variants</a:t>
+                <a:t>130,394 samples</a:t>
               </a:r>
             </a:p>
           </p:txBody>
         </p:sp>
         <p:sp>
           <p:nvSpPr>
-            <p:cNvPr id="109" name="矩形: 圓角 108">
+            <p:cNvPr id="145" name="矩形: 圓角 144">
               <a:extLst>
                 <a:ext uri="{FF2B5EF4-FFF2-40B4-BE49-F238E27FC236}">
-                  <a16:creationId xmlns:a16="http://schemas.microsoft.com/office/drawing/2014/main" id="{E30226F9-C4B1-4495-0AC5-49F3E5383E2B}"/>
+                  <a16:creationId xmlns:a16="http://schemas.microsoft.com/office/drawing/2014/main" id="{6C51D454-AD1D-B8AF-659C-9C468C488928}"/>
                 </a:ext>
               </a:extLst>
             </p:cNvPr>
@@ -6341,8 +7328,8 @@
           </p:nvSpPr>
           <p:spPr>
             <a:xfrm>
-              <a:off x="3555526" y="3315588"/>
-              <a:ext cx="1964209" cy="855233"/>
+              <a:off x="7960838" y="5774408"/>
+              <a:ext cx="1964209" cy="893091"/>
             </a:xfrm>
             <a:prstGeom prst="roundRect">
               <a:avLst/>
@@ -6391,7 +7378,7 @@
                     <a:schemeClr val="tx1"/>
                   </a:solidFill>
                 </a:rPr>
-                <a:t>457,030 samples</a:t>
+                <a:t>BWAS cohort</a:t>
               </a:r>
             </a:p>
             <a:p>
@@ -6412,123 +7399,32 @@
                     <a:schemeClr val="tx1"/>
                   </a:solidFill>
                 </a:rPr>
-                <a:t>7,559,516 variants</a:t>
-              </a:r>
-            </a:p>
-          </p:txBody>
-        </p:sp>
-        <p:sp>
-          <p:nvSpPr>
-            <p:cNvPr id="110" name="矩形: 圓角 109">
-              <a:extLst>
-                <a:ext uri="{FF2B5EF4-FFF2-40B4-BE49-F238E27FC236}">
-                  <a16:creationId xmlns:a16="http://schemas.microsoft.com/office/drawing/2014/main" id="{9B009EEE-72BD-12CE-1E14-0A491CE59682}"/>
-                </a:ext>
-              </a:extLst>
-            </p:cNvPr>
-            <p:cNvSpPr/>
-            <p:nvPr/>
-          </p:nvSpPr>
-          <p:spPr>
-            <a:xfrm>
-              <a:off x="3550762" y="5179142"/>
-              <a:ext cx="1964209" cy="855233"/>
-            </a:xfrm>
-            <a:prstGeom prst="roundRect">
-              <a:avLst/>
-            </a:prstGeom>
-            <a:solidFill>
-              <a:schemeClr val="accent5">
-                <a:lumMod val="60000"/>
-                <a:lumOff val="40000"/>
-              </a:schemeClr>
-            </a:solidFill>
-          </p:spPr>
-          <p:style>
-            <a:lnRef idx="2">
-              <a:schemeClr val="accent1">
-                <a:shade val="15000"/>
-              </a:schemeClr>
-            </a:lnRef>
-            <a:fillRef idx="1">
-              <a:schemeClr val="accent1"/>
-            </a:fillRef>
-            <a:effectRef idx="0">
-              <a:schemeClr val="accent1"/>
-            </a:effectRef>
-            <a:fontRef idx="minor">
-              <a:schemeClr val="lt1"/>
-            </a:fontRef>
-          </p:style>
-          <p:txBody>
-            <a:bodyPr rtlCol="0" anchor="ctr"/>
-            <a:lstStyle/>
-            <a:p>
-              <a:pPr defTabSz="457200">
-                <a:spcBef>
-                  <a:spcPts val="1300"/>
-                </a:spcBef>
-                <a:defRPr sz="3000">
-                  <a:latin typeface="Helvetica Neue"/>
-                  <a:ea typeface="Helvetica Neue"/>
-                  <a:cs typeface="Helvetica Neue"/>
-                  <a:sym typeface="Helvetica Neue"/>
-                </a:defRPr>
-              </a:pPr>
-              <a:r>
-                <a:rPr lang="en-US" altLang="zh-TW" sz="1400" dirty="0">
-                  <a:solidFill>
-                    <a:schemeClr val="tx1"/>
-                  </a:solidFill>
-                </a:rPr>
-                <a:t>159,243 samples</a:t>
-              </a:r>
-            </a:p>
-            <a:p>
-              <a:pPr defTabSz="457200">
-                <a:spcBef>
-                  <a:spcPts val="1300"/>
-                </a:spcBef>
-                <a:defRPr sz="3000">
-                  <a:latin typeface="Helvetica Neue"/>
-                  <a:ea typeface="Helvetica Neue"/>
-                  <a:cs typeface="Helvetica Neue"/>
-                  <a:sym typeface="Helvetica Neue"/>
-                </a:defRPr>
-              </a:pPr>
-              <a:r>
-                <a:rPr lang="en-US" altLang="zh-TW" sz="1400" dirty="0">
-                  <a:solidFill>
-                    <a:schemeClr val="tx1"/>
-                  </a:solidFill>
-                </a:rPr>
-                <a:t>7,559,516 variants</a:t>
+                <a:t>28,849 samples</a:t>
               </a:r>
             </a:p>
           </p:txBody>
         </p:sp>
         <p:cxnSp>
           <p:nvCxnSpPr>
-            <p:cNvPr id="111" name="直線單箭頭接點 110">
+            <p:cNvPr id="147" name="接點: 肘形 146">
               <a:extLst>
                 <a:ext uri="{FF2B5EF4-FFF2-40B4-BE49-F238E27FC236}">
-                  <a16:creationId xmlns:a16="http://schemas.microsoft.com/office/drawing/2014/main" id="{0DD4BCBC-B859-8F0A-93F4-4EA54D079B9D}"/>
+                  <a16:creationId xmlns:a16="http://schemas.microsoft.com/office/drawing/2014/main" id="{F3343EFF-03E7-5717-35C2-38B1E121AB97}"/>
                 </a:ext>
               </a:extLst>
             </p:cNvPr>
             <p:cNvCxnSpPr>
-              <a:cxnSpLocks/>
-              <a:stCxn id="107" idx="2"/>
-              <a:endCxn id="109" idx="0"/>
+              <a:stCxn id="110" idx="3"/>
+              <a:endCxn id="143" idx="1"/>
             </p:cNvCxnSpPr>
             <p:nvPr/>
           </p:nvCxnSpPr>
           <p:spPr>
-            <a:xfrm flipH="1">
-              <a:off x="4537631" y="1842686"/>
-              <a:ext cx="3" cy="1472902"/>
+            <a:xfrm flipV="1">
+              <a:off x="5514971" y="4973179"/>
+              <a:ext cx="2445867" cy="633580"/>
             </a:xfrm>
-            <a:prstGeom prst="straightConnector1">
+            <a:prstGeom prst="bentConnector3">
               <a:avLst/>
             </a:prstGeom>
             <a:ln>
@@ -6552,26 +7448,26 @@
         </p:cxnSp>
         <p:cxnSp>
           <p:nvCxnSpPr>
-            <p:cNvPr id="115" name="直線單箭頭接點 114">
+            <p:cNvPr id="148" name="接點: 肘形 147">
               <a:extLst>
                 <a:ext uri="{FF2B5EF4-FFF2-40B4-BE49-F238E27FC236}">
-                  <a16:creationId xmlns:a16="http://schemas.microsoft.com/office/drawing/2014/main" id="{EEFBE59B-4D95-7243-8961-F4C449EC5802}"/>
+                  <a16:creationId xmlns:a16="http://schemas.microsoft.com/office/drawing/2014/main" id="{8F19B3AA-0869-891F-4552-1663B0B35B20}"/>
                 </a:ext>
               </a:extLst>
             </p:cNvPr>
             <p:cNvCxnSpPr>
               <a:cxnSpLocks/>
-              <a:stCxn id="109" idx="2"/>
-              <a:endCxn id="110" idx="0"/>
+              <a:stCxn id="110" idx="3"/>
+              <a:endCxn id="145" idx="1"/>
             </p:cNvCxnSpPr>
             <p:nvPr/>
           </p:nvCxnSpPr>
           <p:spPr>
-            <a:xfrm flipH="1">
-              <a:off x="4532867" y="4170821"/>
-              <a:ext cx="4764" cy="1008321"/>
+            <a:xfrm>
+              <a:off x="5514971" y="5606759"/>
+              <a:ext cx="2445867" cy="614195"/>
             </a:xfrm>
-            <a:prstGeom prst="straightConnector1">
+            <a:prstGeom prst="bentConnector3">
               <a:avLst/>
             </a:prstGeom>
             <a:ln>
@@ -6595,549 +7491,10 @@
         </p:cxnSp>
         <p:sp>
           <p:nvSpPr>
-            <p:cNvPr id="119" name="橢圓 118">
+            <p:cNvPr id="156" name="文字方塊 155">
               <a:extLst>
                 <a:ext uri="{FF2B5EF4-FFF2-40B4-BE49-F238E27FC236}">
-                  <a16:creationId xmlns:a16="http://schemas.microsoft.com/office/drawing/2014/main" id="{94F7059F-CA36-3A72-4EC1-47BA5343628D}"/>
-                </a:ext>
-              </a:extLst>
-            </p:cNvPr>
-            <p:cNvSpPr/>
-            <p:nvPr/>
-          </p:nvSpPr>
-          <p:spPr>
-            <a:xfrm>
-              <a:off x="4412267" y="2135268"/>
-              <a:ext cx="241200" cy="239873"/>
-            </a:xfrm>
-            <a:prstGeom prst="ellipse">
-              <a:avLst/>
-            </a:prstGeom>
-            <a:solidFill>
-              <a:schemeClr val="bg1"/>
-            </a:solidFill>
-          </p:spPr>
-          <p:style>
-            <a:lnRef idx="2">
-              <a:schemeClr val="accent1">
-                <a:shade val="15000"/>
-              </a:schemeClr>
-            </a:lnRef>
-            <a:fillRef idx="1">
-              <a:schemeClr val="accent1"/>
-            </a:fillRef>
-            <a:effectRef idx="0">
-              <a:schemeClr val="accent1"/>
-            </a:effectRef>
-            <a:fontRef idx="minor">
-              <a:schemeClr val="lt1"/>
-            </a:fontRef>
-          </p:style>
-          <p:txBody>
-            <a:bodyPr rtlCol="0" anchor="ctr"/>
-            <a:lstStyle/>
-            <a:p>
-              <a:pPr algn="ctr"/>
-              <a:endParaRPr lang="zh-TW" altLang="en-US"/>
-            </a:p>
-          </p:txBody>
-        </p:sp>
-        <p:sp>
-          <p:nvSpPr>
-            <p:cNvPr id="120" name="橢圓 119">
-              <a:extLst>
-                <a:ext uri="{FF2B5EF4-FFF2-40B4-BE49-F238E27FC236}">
-                  <a16:creationId xmlns:a16="http://schemas.microsoft.com/office/drawing/2014/main" id="{6F47D02E-A8BC-EDF6-B6C3-28BB24CC2609}"/>
-                </a:ext>
-              </a:extLst>
-            </p:cNvPr>
-            <p:cNvSpPr/>
-            <p:nvPr/>
-          </p:nvSpPr>
-          <p:spPr>
-            <a:xfrm>
-              <a:off x="4412267" y="2714102"/>
-              <a:ext cx="241200" cy="239873"/>
-            </a:xfrm>
-            <a:prstGeom prst="ellipse">
-              <a:avLst/>
-            </a:prstGeom>
-            <a:solidFill>
-              <a:schemeClr val="bg1"/>
-            </a:solidFill>
-          </p:spPr>
-          <p:style>
-            <a:lnRef idx="2">
-              <a:schemeClr val="accent1">
-                <a:shade val="15000"/>
-              </a:schemeClr>
-            </a:lnRef>
-            <a:fillRef idx="1">
-              <a:schemeClr val="accent1"/>
-            </a:fillRef>
-            <a:effectRef idx="0">
-              <a:schemeClr val="accent1"/>
-            </a:effectRef>
-            <a:fontRef idx="minor">
-              <a:schemeClr val="lt1"/>
-            </a:fontRef>
-          </p:style>
-          <p:txBody>
-            <a:bodyPr rtlCol="0" anchor="ctr"/>
-            <a:lstStyle/>
-            <a:p>
-              <a:pPr algn="ctr"/>
-              <a:endParaRPr lang="zh-TW" altLang="en-US"/>
-            </a:p>
-          </p:txBody>
-        </p:sp>
-        <p:cxnSp>
-          <p:nvCxnSpPr>
-            <p:cNvPr id="122" name="接點: 肘形 121">
-              <a:extLst>
-                <a:ext uri="{FF2B5EF4-FFF2-40B4-BE49-F238E27FC236}">
-                  <a16:creationId xmlns:a16="http://schemas.microsoft.com/office/drawing/2014/main" id="{FD02CFF9-6993-B72F-55B0-1E73FF6A56D7}"/>
-                </a:ext>
-              </a:extLst>
-            </p:cNvPr>
-            <p:cNvCxnSpPr>
-              <a:cxnSpLocks/>
-              <a:stCxn id="119" idx="6"/>
-            </p:cNvCxnSpPr>
-            <p:nvPr/>
-          </p:nvCxnSpPr>
-          <p:spPr>
-            <a:xfrm flipV="1">
-              <a:off x="4653467" y="987453"/>
-              <a:ext cx="1896629" cy="1267752"/>
-            </a:xfrm>
-            <a:prstGeom prst="bentConnector3">
-              <a:avLst>
-                <a:gd name="adj1" fmla="val 63811"/>
-              </a:avLst>
-            </a:prstGeom>
-          </p:spPr>
-          <p:style>
-            <a:lnRef idx="2">
-              <a:schemeClr val="dk1"/>
-            </a:lnRef>
-            <a:fillRef idx="0">
-              <a:schemeClr val="dk1"/>
-            </a:fillRef>
-            <a:effectRef idx="1">
-              <a:schemeClr val="dk1"/>
-            </a:effectRef>
-            <a:fontRef idx="minor">
-              <a:schemeClr val="tx1"/>
-            </a:fontRef>
-          </p:style>
-        </p:cxnSp>
-        <mc:AlternateContent xmlns:mc="http://schemas.openxmlformats.org/markup-compatibility/2006">
-          <mc:Choice xmlns:a14="http://schemas.microsoft.com/office/drawing/2010/main" Requires="a14">
-            <p:sp>
-              <p:nvSpPr>
-                <p:cNvPr id="129" name="矩形: 圓角 128">
-                  <a:extLst>
-                    <a:ext uri="{FF2B5EF4-FFF2-40B4-BE49-F238E27FC236}">
-                      <a16:creationId xmlns:a16="http://schemas.microsoft.com/office/drawing/2014/main" id="{F32C1CA4-A51E-4F36-E9D9-A37ED8586D2E}"/>
-                    </a:ext>
-                  </a:extLst>
-                </p:cNvPr>
-                <p:cNvSpPr/>
-                <p:nvPr/>
-              </p:nvSpPr>
-              <p:spPr>
-                <a:xfrm>
-                  <a:off x="6579074" y="2491834"/>
-                  <a:ext cx="5405392" cy="1756316"/>
-                </a:xfrm>
-                <a:prstGeom prst="roundRect">
-                  <a:avLst/>
-                </a:prstGeom>
-                <a:solidFill>
-                  <a:schemeClr val="bg1"/>
-                </a:solidFill>
-              </p:spPr>
-              <p:style>
-                <a:lnRef idx="2">
-                  <a:schemeClr val="accent1">
-                    <a:shade val="15000"/>
-                  </a:schemeClr>
-                </a:lnRef>
-                <a:fillRef idx="1">
-                  <a:schemeClr val="accent1"/>
-                </a:fillRef>
-                <a:effectRef idx="0">
-                  <a:schemeClr val="accent1"/>
-                </a:effectRef>
-                <a:fontRef idx="minor">
-                  <a:schemeClr val="lt1"/>
-                </a:fontRef>
-              </p:style>
-              <p:txBody>
-                <a:bodyPr rtlCol="0" anchor="ctr"/>
-                <a:lstStyle/>
-                <a:p>
-                  <a:pPr marL="372340" indent="-372340" defTabSz="457200">
-                    <a:spcBef>
-                      <a:spcPts val="1300"/>
-                    </a:spcBef>
-                    <a:buSzPct val="150000"/>
-                    <a:buChar char="•"/>
-                    <a:defRPr sz="3000">
-                      <a:latin typeface="Helvetica Neue"/>
-                      <a:ea typeface="Helvetica Neue"/>
-                      <a:cs typeface="Helvetica Neue"/>
-                      <a:sym typeface="Helvetica Neue"/>
-                    </a:defRPr>
-                  </a:pPr>
-                  <a:r>
-                    <a:rPr lang="en-US" altLang="zh-TW" sz="1100" dirty="0">
-                      <a:solidFill>
-                        <a:schemeClr val="tx1"/>
-                      </a:solidFill>
-                    </a:rPr>
-                    <a:t>Info &lt;0.8 </a:t>
-                  </a:r>
-                  <a14:m>
-                    <m:oMath xmlns:m="http://schemas.openxmlformats.org/officeDocument/2006/math">
-                      <m:r>
-                        <a:rPr lang="en-US" altLang="zh-TW" sz="1200" i="1">
-                          <a:solidFill>
-                            <a:schemeClr val="tx1"/>
-                          </a:solidFill>
-                          <a:latin typeface="Cambria Math" panose="02040503050406030204" pitchFamily="18" charset="0"/>
-                        </a:rPr>
-                        <m:t>⟹</m:t>
-                      </m:r>
-                    </m:oMath>
-                  </a14:m>
-                  <a:r>
-                    <a:rPr lang="en-US" altLang="zh-TW" sz="1100" dirty="0">
-                      <a:solidFill>
-                        <a:schemeClr val="tx1"/>
-                      </a:solidFill>
-                    </a:rPr>
-                    <a:t> 144,557,358 variants removed </a:t>
-                  </a:r>
-                </a:p>
-                <a:p>
-                  <a:pPr marL="372340" indent="-372340" defTabSz="457200">
-                    <a:spcBef>
-                      <a:spcPts val="1300"/>
-                    </a:spcBef>
-                    <a:buSzPct val="150000"/>
-                    <a:buChar char="•"/>
-                    <a:defRPr sz="3000">
-                      <a:latin typeface="Helvetica Neue"/>
-                      <a:ea typeface="Helvetica Neue"/>
-                      <a:cs typeface="Helvetica Neue"/>
-                      <a:sym typeface="Helvetica Neue"/>
-                    </a:defRPr>
-                  </a:pPr>
-                  <a:r>
-                    <a:rPr lang="en-US" altLang="zh-TW" sz="1100" dirty="0" err="1">
-                      <a:solidFill>
-                        <a:schemeClr val="tx1"/>
-                      </a:solidFill>
-                    </a:rPr>
-                    <a:t>Maf</a:t>
-                  </a:r>
-                  <a:r>
-                    <a:rPr lang="en-US" altLang="zh-TW" sz="1100" dirty="0">
-                      <a:solidFill>
-                        <a:schemeClr val="tx1"/>
-                      </a:solidFill>
-                    </a:rPr>
-                    <a:t> &lt; 0.01 </a:t>
-                  </a:r>
-                  <a14:m>
-                    <m:oMath xmlns:m="http://schemas.openxmlformats.org/officeDocument/2006/math">
-                      <m:r>
-                        <a:rPr lang="en-US" altLang="zh-TW" sz="1200" i="1">
-                          <a:solidFill>
-                            <a:schemeClr val="tx1"/>
-                          </a:solidFill>
-                          <a:latin typeface="Cambria Math" panose="02040503050406030204" pitchFamily="18" charset="0"/>
-                        </a:rPr>
-                        <m:t>⟹</m:t>
-                      </m:r>
-                    </m:oMath>
-                  </a14:m>
-                  <a:r>
-                    <a:rPr lang="en-US" altLang="zh-TW" sz="1100" dirty="0">
-                      <a:solidFill>
-                        <a:schemeClr val="tx1"/>
-                      </a:solidFill>
-                    </a:rPr>
-                    <a:t> 67,589,102 variants removed </a:t>
-                  </a:r>
-                </a:p>
-                <a:p>
-                  <a:pPr marL="372340" indent="-372340" defTabSz="457200">
-                    <a:spcBef>
-                      <a:spcPts val="1300"/>
-                    </a:spcBef>
-                    <a:buSzPct val="150000"/>
-                    <a:buChar char="•"/>
-                    <a:defRPr sz="3000">
-                      <a:latin typeface="Helvetica Neue"/>
-                      <a:ea typeface="Helvetica Neue"/>
-                      <a:cs typeface="Helvetica Neue"/>
-                      <a:sym typeface="Helvetica Neue"/>
-                    </a:defRPr>
-                  </a:pPr>
-                  <a:r>
-                    <a:rPr lang="en-US" altLang="zh-TW" sz="1100" dirty="0">
-                      <a:solidFill>
-                        <a:schemeClr val="tx1"/>
-                      </a:solidFill>
-                    </a:rPr>
-                    <a:t>Missing genotype &gt; 0.02 </a:t>
-                  </a:r>
-                  <a14:m>
-                    <m:oMath xmlns:m="http://schemas.openxmlformats.org/officeDocument/2006/math">
-                      <m:r>
-                        <a:rPr lang="en-US" altLang="zh-TW" sz="1200" i="1">
-                          <a:solidFill>
-                            <a:schemeClr val="tx1"/>
-                          </a:solidFill>
-                          <a:latin typeface="Cambria Math" panose="02040503050406030204" pitchFamily="18" charset="0"/>
-                        </a:rPr>
-                        <m:t>⟹</m:t>
-                      </m:r>
-                    </m:oMath>
-                  </a14:m>
-                  <a:r>
-                    <a:rPr lang="en-US" altLang="zh-TW" sz="1100" dirty="0">
-                      <a:solidFill>
-                        <a:schemeClr val="tx1"/>
-                      </a:solidFill>
-                    </a:rPr>
-                    <a:t> 1,103,122 variants removed</a:t>
-                  </a:r>
-                </a:p>
-                <a:p>
-                  <a:pPr marL="372340" indent="-372340" defTabSz="457200">
-                    <a:spcBef>
-                      <a:spcPts val="1300"/>
-                    </a:spcBef>
-                    <a:buSzPct val="150000"/>
-                    <a:buChar char="•"/>
-                    <a:defRPr sz="3000">
-                      <a:latin typeface="Helvetica Neue"/>
-                      <a:ea typeface="Helvetica Neue"/>
-                      <a:cs typeface="Helvetica Neue"/>
-                      <a:sym typeface="Helvetica Neue"/>
-                    </a:defRPr>
-                  </a:pPr>
-                  <a:r>
-                    <a:rPr lang="en-US" altLang="zh-TW" sz="1100" dirty="0">
-                      <a:solidFill>
-                        <a:schemeClr val="tx1"/>
-                      </a:solidFill>
-                    </a:rPr>
-                    <a:t>Hardy-Weinberg &lt; </a:t>
-                  </a:r>
-                  <a14:m>
-                    <m:oMath xmlns:m="http://schemas.openxmlformats.org/officeDocument/2006/math">
-                      <m:r>
-                        <a:rPr lang="zh-TW" altLang="en-US" sz="1200" i="1">
-                          <a:solidFill>
-                            <a:schemeClr val="tx1"/>
-                          </a:solidFill>
-                          <a:latin typeface="Cambria Math" panose="02040503050406030204" pitchFamily="18" charset="0"/>
-                        </a:rPr>
-                        <m:t>𝟣</m:t>
-                      </m:r>
-                      <m:r>
-                        <a:rPr lang="en-US" altLang="zh-TW" sz="1200" i="1">
-                          <a:solidFill>
-                            <a:schemeClr val="tx1"/>
-                          </a:solidFill>
-                          <a:latin typeface="Cambria Math" panose="02040503050406030204" pitchFamily="18" charset="0"/>
-                        </a:rPr>
-                        <m:t>×</m:t>
-                      </m:r>
-                      <m:sSup>
-                        <m:sSupPr>
-                          <m:ctrlPr>
-                            <a:rPr lang="ar-AE" altLang="zh-TW" sz="1200" i="1">
-                              <a:solidFill>
-                                <a:schemeClr val="tx1"/>
-                              </a:solidFill>
-                              <a:latin typeface="Cambria Math" panose="02040503050406030204" pitchFamily="18" charset="0"/>
-                            </a:rPr>
-                          </m:ctrlPr>
-                        </m:sSupPr>
-                        <m:e>
-                          <m:r>
-                            <a:rPr lang="zh-TW" altLang="ar-AE" sz="1200" i="1">
-                              <a:solidFill>
-                                <a:schemeClr val="tx1"/>
-                              </a:solidFill>
-                              <a:latin typeface="Cambria Math" panose="02040503050406030204" pitchFamily="18" charset="0"/>
-                            </a:rPr>
-                            <m:t>𝟣𝟢</m:t>
-                          </m:r>
-                        </m:e>
-                        <m:sup>
-                          <m:r>
-                            <a:rPr lang="ar-AE" altLang="zh-TW" sz="1200" i="1">
-                              <a:solidFill>
-                                <a:schemeClr val="tx1"/>
-                              </a:solidFill>
-                              <a:latin typeface="Cambria Math" panose="02040503050406030204" pitchFamily="18" charset="0"/>
-                            </a:rPr>
-                            <m:t>−</m:t>
-                          </m:r>
-                          <m:r>
-                            <a:rPr lang="zh-TW" altLang="ar-AE" sz="1200" i="1">
-                              <a:solidFill>
-                                <a:schemeClr val="tx1"/>
-                              </a:solidFill>
-                              <a:latin typeface="Cambria Math" panose="02040503050406030204" pitchFamily="18" charset="0"/>
-                            </a:rPr>
-                            <m:t>𝟨</m:t>
-                          </m:r>
-                        </m:sup>
-                      </m:sSup>
-                    </m:oMath>
-                  </a14:m>
-                  <a:r>
-                    <a:rPr lang="ar-AE" altLang="zh-TW" sz="1100" dirty="0">
-                      <a:solidFill>
-                        <a:schemeClr val="tx1"/>
-                      </a:solidFill>
-                    </a:rPr>
-                    <a:t> </a:t>
-                  </a:r>
-                  <a14:m>
-                    <m:oMath xmlns:m="http://schemas.openxmlformats.org/officeDocument/2006/math">
-                      <m:r>
-                        <a:rPr lang="ar-AE" altLang="zh-TW" sz="1200" i="1">
-                          <a:solidFill>
-                            <a:schemeClr val="tx1"/>
-                          </a:solidFill>
-                          <a:latin typeface="Cambria Math" panose="02040503050406030204" pitchFamily="18" charset="0"/>
-                        </a:rPr>
-                        <m:t>⟹</m:t>
-                      </m:r>
-                    </m:oMath>
-                  </a14:m>
-                  <a:r>
-                    <a:rPr lang="ar-AE" altLang="zh-TW" sz="1100" dirty="0">
-                      <a:solidFill>
-                        <a:schemeClr val="tx1"/>
-                      </a:solidFill>
-                    </a:rPr>
-                    <a:t> 24,920 </a:t>
-                  </a:r>
-                  <a:r>
-                    <a:rPr lang="en-US" altLang="zh-TW" sz="1100" dirty="0">
-                      <a:solidFill>
-                        <a:schemeClr val="tx1"/>
-                      </a:solidFill>
-                    </a:rPr>
-                    <a:t>variants removed</a:t>
-                  </a:r>
-                </a:p>
-              </p:txBody>
-            </p:sp>
-          </mc:Choice>
-          <mc:Fallback>
-            <p:sp>
-              <p:nvSpPr>
-                <p:cNvPr id="129" name="矩形: 圓角 128">
-                  <a:extLst>
-                    <a:ext uri="{FF2B5EF4-FFF2-40B4-BE49-F238E27FC236}">
-                      <a16:creationId xmlns:a16="http://schemas.microsoft.com/office/drawing/2014/main" id="{F32C1CA4-A51E-4F36-E9D9-A37ED8586D2E}"/>
-                    </a:ext>
-                  </a:extLst>
-                </p:cNvPr>
-                <p:cNvSpPr>
-                  <a:spLocks noRot="1" noChangeAspect="1" noMove="1" noResize="1" noEditPoints="1" noAdjustHandles="1" noChangeArrowheads="1" noChangeShapeType="1" noTextEdit="1"/>
-                </p:cNvSpPr>
-                <p:nvPr/>
-              </p:nvSpPr>
-              <p:spPr>
-                <a:xfrm>
-                  <a:off x="6579074" y="2491834"/>
-                  <a:ext cx="5405392" cy="1756316"/>
-                </a:xfrm>
-                <a:prstGeom prst="roundRect">
-                  <a:avLst/>
-                </a:prstGeom>
-                <a:blipFill>
-                  <a:blip r:embed="rId4"/>
-                  <a:stretch>
-                    <a:fillRect/>
-                  </a:stretch>
-                </a:blipFill>
-              </p:spPr>
-              <p:txBody>
-                <a:bodyPr/>
-                <a:lstStyle/>
-                <a:p>
-                  <a:r>
-                    <a:rPr lang="zh-TW" altLang="en-US">
-                      <a:noFill/>
-                    </a:rPr>
-                    <a:t> </a:t>
-                  </a:r>
-                </a:p>
-              </p:txBody>
-            </p:sp>
-          </mc:Fallback>
-        </mc:AlternateContent>
-        <p:cxnSp>
-          <p:nvCxnSpPr>
-            <p:cNvPr id="130" name="接點: 肘形 129">
-              <a:extLst>
-                <a:ext uri="{FF2B5EF4-FFF2-40B4-BE49-F238E27FC236}">
-                  <a16:creationId xmlns:a16="http://schemas.microsoft.com/office/drawing/2014/main" id="{332316D8-5169-D78E-1557-5A985ACF452A}"/>
-                </a:ext>
-              </a:extLst>
-            </p:cNvPr>
-            <p:cNvCxnSpPr>
-              <a:cxnSpLocks/>
-              <a:stCxn id="120" idx="6"/>
-              <a:endCxn id="129" idx="1"/>
-            </p:cNvCxnSpPr>
-            <p:nvPr/>
-          </p:nvCxnSpPr>
-          <p:spPr>
-            <a:xfrm>
-              <a:off x="4653467" y="2834039"/>
-              <a:ext cx="1925607" cy="535953"/>
-            </a:xfrm>
-            <a:prstGeom prst="bentConnector3">
-              <a:avLst>
-                <a:gd name="adj1" fmla="val 50000"/>
-              </a:avLst>
-            </a:prstGeom>
-          </p:spPr>
-          <p:style>
-            <a:lnRef idx="2">
-              <a:schemeClr val="dk1"/>
-            </a:lnRef>
-            <a:fillRef idx="0">
-              <a:schemeClr val="dk1"/>
-            </a:fillRef>
-            <a:effectRef idx="1">
-              <a:schemeClr val="dk1"/>
-            </a:effectRef>
-            <a:fontRef idx="minor">
-              <a:schemeClr val="tx1"/>
-            </a:fontRef>
-          </p:style>
-        </p:cxnSp>
-        <p:sp>
-          <p:nvSpPr>
-            <p:cNvPr id="140" name="文字方塊 139">
-              <a:extLst>
-                <a:ext uri="{FF2B5EF4-FFF2-40B4-BE49-F238E27FC236}">
-                  <a16:creationId xmlns:a16="http://schemas.microsoft.com/office/drawing/2014/main" id="{AE949E78-DE13-09A4-6233-B6B71DC09A5F}"/>
+                  <a16:creationId xmlns:a16="http://schemas.microsoft.com/office/drawing/2014/main" id="{3DE83404-D1B2-5F1F-087E-002C520DB115}"/>
                 </a:ext>
               </a:extLst>
             </p:cNvPr>
@@ -7146,43 +7503,8 @@
           </p:nvSpPr>
           <p:spPr>
             <a:xfrm>
-              <a:off x="2206282" y="4449958"/>
-              <a:ext cx="2523982" cy="523220"/>
-            </a:xfrm>
-            <a:prstGeom prst="rect">
-              <a:avLst/>
-            </a:prstGeom>
-            <a:noFill/>
-          </p:spPr>
-          <p:txBody>
-            <a:bodyPr wrap="square" rtlCol="0">
-              <a:spAutoFit/>
-            </a:bodyPr>
-            <a:lstStyle/>
-            <a:p>
-              <a:r>
-                <a:rPr lang="en-US" altLang="zh-TW" sz="1400" dirty="0"/>
-                <a:t>Participants with BRS score and baseline covariates</a:t>
-              </a:r>
-            </a:p>
-          </p:txBody>
-        </p:sp>
-        <p:sp>
-          <p:nvSpPr>
-            <p:cNvPr id="141" name="文字方塊 140">
-              <a:extLst>
-                <a:ext uri="{FF2B5EF4-FFF2-40B4-BE49-F238E27FC236}">
-                  <a16:creationId xmlns:a16="http://schemas.microsoft.com/office/drawing/2014/main" id="{6EB0C335-ADF3-2F25-6FBF-E44529253DDA}"/>
-                </a:ext>
-              </a:extLst>
-            </p:cNvPr>
-            <p:cNvSpPr txBox="1"/>
-            <p:nvPr/>
-          </p:nvSpPr>
-          <p:spPr>
-            <a:xfrm>
-              <a:off x="4803090" y="2537587"/>
-              <a:ext cx="809837" cy="307777"/>
+              <a:off x="4932693" y="6307303"/>
+              <a:ext cx="2969339" cy="307777"/>
             </a:xfrm>
             <a:prstGeom prst="rect">
               <a:avLst/>
@@ -7196,359 +7518,58 @@
             <a:lstStyle/>
             <a:p>
               <a:r>
-                <a:rPr lang="en-US" altLang="zh-TW" sz="1400" dirty="0"/>
-                <a:t>SNP QC</a:t>
+                <a:rPr lang="en-US" altLang="zh-TW" sz="1400" b="1" dirty="0"/>
+                <a:t>Participants with valid </a:t>
               </a:r>
-              <a:endParaRPr lang="zh-TW" altLang="en-US" sz="1400" dirty="0"/>
+              <a:r>
+                <a:rPr lang="en-US" altLang="zh-TW" sz="1400" b="1" dirty="0" err="1"/>
+                <a:t>rsfMRI</a:t>
+              </a:r>
+              <a:r>
+                <a:rPr lang="en-US" altLang="zh-TW" sz="1400" b="1" dirty="0"/>
+                <a:t> data</a:t>
+              </a:r>
+              <a:endParaRPr lang="zh-TW" altLang="en-US" sz="1400" b="1" dirty="0"/>
+            </a:p>
+          </p:txBody>
+        </p:sp>
+        <p:sp>
+          <p:nvSpPr>
+            <p:cNvPr id="157" name="文字方塊 156">
+              <a:extLst>
+                <a:ext uri="{FF2B5EF4-FFF2-40B4-BE49-F238E27FC236}">
+                  <a16:creationId xmlns:a16="http://schemas.microsoft.com/office/drawing/2014/main" id="{A4559F86-CCB2-737E-FFCC-38996EAFDF78}"/>
+                </a:ext>
+              </a:extLst>
+            </p:cNvPr>
+            <p:cNvSpPr txBox="1"/>
+            <p:nvPr/>
+          </p:nvSpPr>
+          <p:spPr>
+            <a:xfrm>
+              <a:off x="6141889" y="4590355"/>
+              <a:ext cx="1683218" cy="307777"/>
+            </a:xfrm>
+            <a:prstGeom prst="rect">
+              <a:avLst/>
+            </a:prstGeom>
+            <a:noFill/>
+          </p:spPr>
+          <p:txBody>
+            <a:bodyPr wrap="none" rtlCol="0">
+              <a:spAutoFit/>
+            </a:bodyPr>
+            <a:lstStyle/>
+            <a:p>
+              <a:r>
+                <a:rPr lang="en-US" altLang="zh-TW" sz="1400" b="1" dirty="0"/>
+                <a:t>Other participants</a:t>
+              </a:r>
+              <a:endParaRPr lang="zh-TW" altLang="en-US" sz="1400" b="1" dirty="0"/>
             </a:p>
           </p:txBody>
         </p:sp>
       </p:grpSp>
-      <p:sp>
-        <p:nvSpPr>
-          <p:cNvPr id="143" name="矩形: 圓角 142">
-            <a:extLst>
-              <a:ext uri="{FF2B5EF4-FFF2-40B4-BE49-F238E27FC236}">
-                <a16:creationId xmlns:a16="http://schemas.microsoft.com/office/drawing/2014/main" id="{231EA7D0-4488-34D5-DF19-F208163C1FA1}"/>
-              </a:ext>
-            </a:extLst>
-          </p:cNvPr>
-          <p:cNvSpPr/>
-          <p:nvPr/>
-        </p:nvSpPr>
-        <p:spPr>
-          <a:xfrm>
-            <a:off x="7960838" y="4526633"/>
-            <a:ext cx="1964209" cy="893091"/>
-          </a:xfrm>
-          <a:prstGeom prst="roundRect">
-            <a:avLst/>
-          </a:prstGeom>
-          <a:solidFill>
-            <a:schemeClr val="accent5">
-              <a:lumMod val="60000"/>
-              <a:lumOff val="40000"/>
-            </a:schemeClr>
-          </a:solidFill>
-        </p:spPr>
-        <p:style>
-          <a:lnRef idx="2">
-            <a:schemeClr val="accent1">
-              <a:shade val="15000"/>
-            </a:schemeClr>
-          </a:lnRef>
-          <a:fillRef idx="1">
-            <a:schemeClr val="accent1"/>
-          </a:fillRef>
-          <a:effectRef idx="0">
-            <a:schemeClr val="accent1"/>
-          </a:effectRef>
-          <a:fontRef idx="minor">
-            <a:schemeClr val="lt1"/>
-          </a:fontRef>
-        </p:style>
-        <p:txBody>
-          <a:bodyPr rtlCol="0" anchor="ctr"/>
-          <a:lstStyle/>
-          <a:p>
-            <a:pPr defTabSz="457200">
-              <a:spcBef>
-                <a:spcPts val="1300"/>
-              </a:spcBef>
-              <a:defRPr sz="3000">
-                <a:latin typeface="Helvetica Neue"/>
-                <a:ea typeface="Helvetica Neue"/>
-                <a:cs typeface="Helvetica Neue"/>
-                <a:sym typeface="Helvetica Neue"/>
-              </a:defRPr>
-            </a:pPr>
-            <a:r>
-              <a:rPr lang="en-US" altLang="zh-TW" sz="1400" dirty="0">
-                <a:solidFill>
-                  <a:schemeClr val="tx1"/>
-                </a:solidFill>
-              </a:rPr>
-              <a:t>GWAS cohort</a:t>
-            </a:r>
-          </a:p>
-          <a:p>
-            <a:pPr defTabSz="457200">
-              <a:spcBef>
-                <a:spcPts val="1300"/>
-              </a:spcBef>
-              <a:defRPr sz="3000">
-                <a:latin typeface="Helvetica Neue"/>
-                <a:ea typeface="Helvetica Neue"/>
-                <a:cs typeface="Helvetica Neue"/>
-                <a:sym typeface="Helvetica Neue"/>
-              </a:defRPr>
-            </a:pPr>
-            <a:r>
-              <a:rPr lang="en-US" altLang="zh-TW" sz="1400" dirty="0">
-                <a:solidFill>
-                  <a:schemeClr val="tx1"/>
-                </a:solidFill>
-              </a:rPr>
-              <a:t>130,394 samples</a:t>
-            </a:r>
-          </a:p>
-        </p:txBody>
-      </p:sp>
-      <p:sp>
-        <p:nvSpPr>
-          <p:cNvPr id="145" name="矩形: 圓角 144">
-            <a:extLst>
-              <a:ext uri="{FF2B5EF4-FFF2-40B4-BE49-F238E27FC236}">
-                <a16:creationId xmlns:a16="http://schemas.microsoft.com/office/drawing/2014/main" id="{6C51D454-AD1D-B8AF-659C-9C468C488928}"/>
-              </a:ext>
-            </a:extLst>
-          </p:cNvPr>
-          <p:cNvSpPr/>
-          <p:nvPr/>
-        </p:nvSpPr>
-        <p:spPr>
-          <a:xfrm>
-            <a:off x="7960838" y="5774408"/>
-            <a:ext cx="1964209" cy="893091"/>
-          </a:xfrm>
-          <a:prstGeom prst="roundRect">
-            <a:avLst/>
-          </a:prstGeom>
-          <a:solidFill>
-            <a:schemeClr val="accent5">
-              <a:lumMod val="60000"/>
-              <a:lumOff val="40000"/>
-            </a:schemeClr>
-          </a:solidFill>
-        </p:spPr>
-        <p:style>
-          <a:lnRef idx="2">
-            <a:schemeClr val="accent1">
-              <a:shade val="15000"/>
-            </a:schemeClr>
-          </a:lnRef>
-          <a:fillRef idx="1">
-            <a:schemeClr val="accent1"/>
-          </a:fillRef>
-          <a:effectRef idx="0">
-            <a:schemeClr val="accent1"/>
-          </a:effectRef>
-          <a:fontRef idx="minor">
-            <a:schemeClr val="lt1"/>
-          </a:fontRef>
-        </p:style>
-        <p:txBody>
-          <a:bodyPr rtlCol="0" anchor="ctr"/>
-          <a:lstStyle/>
-          <a:p>
-            <a:pPr defTabSz="457200">
-              <a:spcBef>
-                <a:spcPts val="1300"/>
-              </a:spcBef>
-              <a:defRPr sz="3000">
-                <a:latin typeface="Helvetica Neue"/>
-                <a:ea typeface="Helvetica Neue"/>
-                <a:cs typeface="Helvetica Neue"/>
-                <a:sym typeface="Helvetica Neue"/>
-              </a:defRPr>
-            </a:pPr>
-            <a:r>
-              <a:rPr lang="en-US" altLang="zh-TW" sz="1400" dirty="0">
-                <a:solidFill>
-                  <a:schemeClr val="tx1"/>
-                </a:solidFill>
-              </a:rPr>
-              <a:t>BWAS cohort</a:t>
-            </a:r>
-          </a:p>
-          <a:p>
-            <a:pPr defTabSz="457200">
-              <a:spcBef>
-                <a:spcPts val="1300"/>
-              </a:spcBef>
-              <a:defRPr sz="3000">
-                <a:latin typeface="Helvetica Neue"/>
-                <a:ea typeface="Helvetica Neue"/>
-                <a:cs typeface="Helvetica Neue"/>
-                <a:sym typeface="Helvetica Neue"/>
-              </a:defRPr>
-            </a:pPr>
-            <a:r>
-              <a:rPr lang="en-US" altLang="zh-TW" sz="1400" dirty="0">
-                <a:solidFill>
-                  <a:schemeClr val="tx1"/>
-                </a:solidFill>
-              </a:rPr>
-              <a:t>28,849 samples</a:t>
-            </a:r>
-          </a:p>
-        </p:txBody>
-      </p:sp>
-      <p:cxnSp>
-        <p:nvCxnSpPr>
-          <p:cNvPr id="147" name="接點: 肘形 146">
-            <a:extLst>
-              <a:ext uri="{FF2B5EF4-FFF2-40B4-BE49-F238E27FC236}">
-                <a16:creationId xmlns:a16="http://schemas.microsoft.com/office/drawing/2014/main" id="{F3343EFF-03E7-5717-35C2-38B1E121AB97}"/>
-              </a:ext>
-            </a:extLst>
-          </p:cNvPr>
-          <p:cNvCxnSpPr>
-            <a:stCxn id="110" idx="3"/>
-            <a:endCxn id="143" idx="1"/>
-          </p:cNvCxnSpPr>
-          <p:nvPr/>
-        </p:nvCxnSpPr>
-        <p:spPr>
-          <a:xfrm flipV="1">
-            <a:off x="5514971" y="4973179"/>
-            <a:ext cx="2445867" cy="633580"/>
-          </a:xfrm>
-          <a:prstGeom prst="bentConnector3">
-            <a:avLst/>
-          </a:prstGeom>
-          <a:ln>
-            <a:tailEnd type="triangle"/>
-          </a:ln>
-        </p:spPr>
-        <p:style>
-          <a:lnRef idx="2">
-            <a:schemeClr val="dk1"/>
-          </a:lnRef>
-          <a:fillRef idx="0">
-            <a:schemeClr val="dk1"/>
-          </a:fillRef>
-          <a:effectRef idx="1">
-            <a:schemeClr val="dk1"/>
-          </a:effectRef>
-          <a:fontRef idx="minor">
-            <a:schemeClr val="tx1"/>
-          </a:fontRef>
-        </p:style>
-      </p:cxnSp>
-      <p:cxnSp>
-        <p:nvCxnSpPr>
-          <p:cNvPr id="148" name="接點: 肘形 147">
-            <a:extLst>
-              <a:ext uri="{FF2B5EF4-FFF2-40B4-BE49-F238E27FC236}">
-                <a16:creationId xmlns:a16="http://schemas.microsoft.com/office/drawing/2014/main" id="{8F19B3AA-0869-891F-4552-1663B0B35B20}"/>
-              </a:ext>
-            </a:extLst>
-          </p:cNvPr>
-          <p:cNvCxnSpPr>
-            <a:cxnSpLocks/>
-            <a:stCxn id="110" idx="3"/>
-            <a:endCxn id="145" idx="1"/>
-          </p:cNvCxnSpPr>
-          <p:nvPr/>
-        </p:nvCxnSpPr>
-        <p:spPr>
-          <a:xfrm>
-            <a:off x="5514971" y="5606759"/>
-            <a:ext cx="2445867" cy="614195"/>
-          </a:xfrm>
-          <a:prstGeom prst="bentConnector3">
-            <a:avLst/>
-          </a:prstGeom>
-          <a:ln>
-            <a:tailEnd type="triangle"/>
-          </a:ln>
-        </p:spPr>
-        <p:style>
-          <a:lnRef idx="2">
-            <a:schemeClr val="dk1"/>
-          </a:lnRef>
-          <a:fillRef idx="0">
-            <a:schemeClr val="dk1"/>
-          </a:fillRef>
-          <a:effectRef idx="1">
-            <a:schemeClr val="dk1"/>
-          </a:effectRef>
-          <a:fontRef idx="minor">
-            <a:schemeClr val="tx1"/>
-          </a:fontRef>
-        </p:style>
-      </p:cxnSp>
-      <p:sp>
-        <p:nvSpPr>
-          <p:cNvPr id="156" name="文字方塊 155">
-            <a:extLst>
-              <a:ext uri="{FF2B5EF4-FFF2-40B4-BE49-F238E27FC236}">
-                <a16:creationId xmlns:a16="http://schemas.microsoft.com/office/drawing/2014/main" id="{3DE83404-D1B2-5F1F-087E-002C520DB115}"/>
-              </a:ext>
-            </a:extLst>
-          </p:cNvPr>
-          <p:cNvSpPr txBox="1"/>
-          <p:nvPr/>
-        </p:nvSpPr>
-        <p:spPr>
-          <a:xfrm>
-            <a:off x="5175580" y="6307303"/>
-            <a:ext cx="2806987" cy="307777"/>
-          </a:xfrm>
-          <a:prstGeom prst="rect">
-            <a:avLst/>
-          </a:prstGeom>
-          <a:noFill/>
-        </p:spPr>
-        <p:txBody>
-          <a:bodyPr wrap="none" rtlCol="0">
-            <a:spAutoFit/>
-          </a:bodyPr>
-          <a:lstStyle/>
-          <a:p>
-            <a:r>
-              <a:rPr lang="en-US" altLang="zh-TW" sz="1400" dirty="0"/>
-              <a:t>Participants with valid </a:t>
-            </a:r>
-            <a:r>
-              <a:rPr lang="en-US" altLang="zh-TW" sz="1400" dirty="0" err="1"/>
-              <a:t>rsfMRI</a:t>
-            </a:r>
-            <a:r>
-              <a:rPr lang="en-US" altLang="zh-TW" sz="1400" dirty="0"/>
-              <a:t> data</a:t>
-            </a:r>
-            <a:endParaRPr lang="zh-TW" altLang="en-US" sz="1400" dirty="0"/>
-          </a:p>
-        </p:txBody>
-      </p:sp>
-      <p:sp>
-        <p:nvSpPr>
-          <p:cNvPr id="157" name="文字方塊 156">
-            <a:extLst>
-              <a:ext uri="{FF2B5EF4-FFF2-40B4-BE49-F238E27FC236}">
-                <a16:creationId xmlns:a16="http://schemas.microsoft.com/office/drawing/2014/main" id="{A4559F86-CCB2-737E-FFCC-38996EAFDF78}"/>
-              </a:ext>
-            </a:extLst>
-          </p:cNvPr>
-          <p:cNvSpPr txBox="1"/>
-          <p:nvPr/>
-        </p:nvSpPr>
-        <p:spPr>
-          <a:xfrm>
-            <a:off x="6185202" y="4596018"/>
-            <a:ext cx="1599412" cy="307777"/>
-          </a:xfrm>
-          <a:prstGeom prst="rect">
-            <a:avLst/>
-          </a:prstGeom>
-          <a:noFill/>
-        </p:spPr>
-        <p:txBody>
-          <a:bodyPr wrap="none" rtlCol="0">
-            <a:spAutoFit/>
-          </a:bodyPr>
-          <a:lstStyle/>
-          <a:p>
-            <a:r>
-              <a:rPr lang="en-US" altLang="zh-TW" sz="1400" dirty="0"/>
-              <a:t>Other participants</a:t>
-            </a:r>
-            <a:endParaRPr lang="zh-TW" altLang="en-US" sz="1400" dirty="0"/>
-          </a:p>
-        </p:txBody>
-      </p:sp>
     </p:spTree>
     <p:extLst>
       <p:ext uri="{BB962C8B-B14F-4D97-AF65-F5344CB8AC3E}">

</xml_diff>